<commit_message>
update. Added to chirps
</commit_message>
<xml_diff>
--- a/The ambiguity function with applications.pptx
+++ b/The ambiguity function with applications.pptx
@@ -6,8 +6,8 @@
   </p:sldMasterIdLst>
   <p:sldIdLst>
     <p:sldId id="257" r:id="rId5"/>
-    <p:sldId id="276" r:id="rId6"/>
-    <p:sldId id="277" r:id="rId7"/>
+    <p:sldId id="277" r:id="rId6"/>
+    <p:sldId id="276" r:id="rId7"/>
     <p:sldId id="279" r:id="rId8"/>
     <p:sldId id="262" r:id="rId9"/>
     <p:sldId id="264" r:id="rId10"/>
@@ -17,11 +17,12 @@
     <p:sldId id="273" r:id="rId14"/>
     <p:sldId id="269" r:id="rId15"/>
     <p:sldId id="271" r:id="rId16"/>
-    <p:sldId id="267" r:id="rId17"/>
-    <p:sldId id="268" r:id="rId18"/>
-    <p:sldId id="270" r:id="rId19"/>
-    <p:sldId id="280" r:id="rId20"/>
-    <p:sldId id="278" r:id="rId21"/>
+    <p:sldId id="281" r:id="rId17"/>
+    <p:sldId id="267" r:id="rId18"/>
+    <p:sldId id="268" r:id="rId19"/>
+    <p:sldId id="270" r:id="rId20"/>
+    <p:sldId id="280" r:id="rId21"/>
+    <p:sldId id="278" r:id="rId22"/>
   </p:sldIdLst>
   <p:sldSz cx="12192000" cy="6858000"/>
   <p:notesSz cx="6858000" cy="9144000"/>
@@ -5052,6 +5053,460 @@
           <p:cNvPr id="2" name="Title 1">
             <a:extLst>
               <a:ext uri="{FF2B5EF4-FFF2-40B4-BE49-F238E27FC236}">
+                <a16:creationId xmlns:a16="http://schemas.microsoft.com/office/drawing/2014/main" id="{15736015-E794-46E0-840E-1D6B67C1E5D4}"/>
+              </a:ext>
+            </a:extLst>
+          </p:cNvPr>
+          <p:cNvSpPr>
+            <a:spLocks noGrp="1"/>
+          </p:cNvSpPr>
+          <p:nvPr>
+            <p:ph type="title"/>
+          </p:nvPr>
+        </p:nvSpPr>
+        <p:spPr/>
+        <p:txBody>
+          <a:bodyPr/>
+          <a:lstStyle/>
+          <a:p>
+            <a:r>
+              <a:rPr lang="en-US" dirty="0"/>
+              <a:t>Chirp (Linear)</a:t>
+            </a:r>
+          </a:p>
+        </p:txBody>
+      </p:sp>
+      <p:pic>
+        <p:nvPicPr>
+          <p:cNvPr id="5" name="Picture 4" descr="A close up of a logo&#10;&#10;Description automatically generated">
+            <a:extLst>
+              <a:ext uri="{FF2B5EF4-FFF2-40B4-BE49-F238E27FC236}">
+                <a16:creationId xmlns:a16="http://schemas.microsoft.com/office/drawing/2014/main" id="{38CA368D-6E14-416A-9E93-043952946190}"/>
+              </a:ext>
+            </a:extLst>
+          </p:cNvPr>
+          <p:cNvPicPr>
+            <a:picLocks noChangeAspect="1"/>
+          </p:cNvPicPr>
+          <p:nvPr/>
+        </p:nvPicPr>
+        <p:blipFill>
+          <a:blip r:embed="rId2"/>
+          <a:stretch>
+            <a:fillRect/>
+          </a:stretch>
+        </p:blipFill>
+        <p:spPr>
+          <a:xfrm>
+            <a:off x="6007202" y="2706645"/>
+            <a:ext cx="3910520" cy="3910520"/>
+          </a:xfrm>
+          <a:prstGeom prst="rect">
+            <a:avLst/>
+          </a:prstGeom>
+        </p:spPr>
+      </p:pic>
+      <p:pic>
+        <p:nvPicPr>
+          <p:cNvPr id="7" name="Picture 6">
+            <a:extLst>
+              <a:ext uri="{FF2B5EF4-FFF2-40B4-BE49-F238E27FC236}">
+                <a16:creationId xmlns:a16="http://schemas.microsoft.com/office/drawing/2014/main" id="{A81A2A12-08B6-4C9D-B74A-DEF489B1E6FE}"/>
+              </a:ext>
+            </a:extLst>
+          </p:cNvPr>
+          <p:cNvPicPr>
+            <a:picLocks noChangeAspect="1"/>
+          </p:cNvPicPr>
+          <p:nvPr/>
+        </p:nvPicPr>
+        <p:blipFill>
+          <a:blip r:embed="rId3"/>
+          <a:stretch>
+            <a:fillRect/>
+          </a:stretch>
+        </p:blipFill>
+        <p:spPr>
+          <a:xfrm>
+            <a:off x="2096682" y="2706645"/>
+            <a:ext cx="3910520" cy="3910520"/>
+          </a:xfrm>
+          <a:prstGeom prst="rect">
+            <a:avLst/>
+          </a:prstGeom>
+        </p:spPr>
+      </p:pic>
+      <mc:AlternateContent xmlns:mc="http://schemas.openxmlformats.org/markup-compatibility/2006">
+        <mc:Choice xmlns:a14="http://schemas.microsoft.com/office/drawing/2010/main" Requires="a14">
+          <p:sp>
+            <p:nvSpPr>
+              <p:cNvPr id="10" name="Content Placeholder 2">
+                <a:extLst>
+                  <a:ext uri="{FF2B5EF4-FFF2-40B4-BE49-F238E27FC236}">
+                    <a16:creationId xmlns:a16="http://schemas.microsoft.com/office/drawing/2014/main" id="{3B334B13-D5EE-4F81-B977-32938FCD9FD9}"/>
+                  </a:ext>
+                </a:extLst>
+              </p:cNvPr>
+              <p:cNvSpPr>
+                <a:spLocks noGrp="1"/>
+              </p:cNvSpPr>
+              <p:nvPr>
+                <p:ph idx="1"/>
+              </p:nvPr>
+            </p:nvSpPr>
+            <p:spPr>
+              <a:xfrm>
+                <a:off x="1066800" y="2103120"/>
+                <a:ext cx="10058400" cy="3849624"/>
+              </a:xfrm>
+            </p:spPr>
+            <p:txBody>
+              <a:bodyPr/>
+              <a:lstStyle/>
+              <a:p>
+                <a14:m>
+                  <m:oMath xmlns:m="http://schemas.openxmlformats.org/officeDocument/2006/math">
+                    <m:r>
+                      <a:rPr lang="en-US" b="0" i="1" smtClean="0">
+                        <a:latin typeface="Cambria Math" panose="02040503050406030204" pitchFamily="18" charset="0"/>
+                      </a:rPr>
+                      <m:t>𝐶</m:t>
+                    </m:r>
+                    <m:d>
+                      <m:dPr>
+                        <m:ctrlPr>
+                          <a:rPr lang="en-US" b="0" i="1" smtClean="0">
+                            <a:latin typeface="Cambria Math" panose="02040503050406030204" pitchFamily="18" charset="0"/>
+                          </a:rPr>
+                        </m:ctrlPr>
+                      </m:dPr>
+                      <m:e>
+                        <m:r>
+                          <a:rPr lang="en-US" b="0" i="1" smtClean="0">
+                            <a:latin typeface="Cambria Math" panose="02040503050406030204" pitchFamily="18" charset="0"/>
+                          </a:rPr>
+                          <m:t>𝑡</m:t>
+                        </m:r>
+                      </m:e>
+                    </m:d>
+                    <m:r>
+                      <a:rPr lang="en-US" b="0" i="1" smtClean="0">
+                        <a:latin typeface="Cambria Math" panose="02040503050406030204" pitchFamily="18" charset="0"/>
+                      </a:rPr>
+                      <m:t>=</m:t>
+                    </m:r>
+                    <m:func>
+                      <m:funcPr>
+                        <m:ctrlPr>
+                          <a:rPr lang="en-US" b="0" i="1" smtClean="0">
+                            <a:latin typeface="Cambria Math" panose="02040503050406030204" pitchFamily="18" charset="0"/>
+                          </a:rPr>
+                        </m:ctrlPr>
+                      </m:funcPr>
+                      <m:fName>
+                        <m:r>
+                          <m:rPr>
+                            <m:sty m:val="p"/>
+                          </m:rPr>
+                          <a:rPr lang="en-US" b="0" i="0" smtClean="0">
+                            <a:latin typeface="Cambria Math" panose="02040503050406030204" pitchFamily="18" charset="0"/>
+                          </a:rPr>
+                          <m:t>sin</m:t>
+                        </m:r>
+                      </m:fName>
+                      <m:e>
+                        <m:r>
+                          <a:rPr lang="en-US" b="0" i="1" smtClean="0">
+                            <a:latin typeface="Cambria Math" panose="02040503050406030204" pitchFamily="18" charset="0"/>
+                          </a:rPr>
+                          <m:t>[</m:t>
+                        </m:r>
+                        <m:sSub>
+                          <m:sSubPr>
+                            <m:ctrlPr>
+                              <a:rPr lang="en-US" b="0" i="1" smtClean="0">
+                                <a:latin typeface="Cambria Math" panose="02040503050406030204" pitchFamily="18" charset="0"/>
+                              </a:rPr>
+                            </m:ctrlPr>
+                          </m:sSubPr>
+                          <m:e>
+                            <m:r>
+                              <a:rPr lang="en-US" b="0" i="1" smtClean="0">
+                                <a:latin typeface="Cambria Math" panose="02040503050406030204" pitchFamily="18" charset="0"/>
+                                <a:ea typeface="Cambria Math" panose="02040503050406030204" pitchFamily="18" charset="0"/>
+                              </a:rPr>
+                              <m:t>𝜑</m:t>
+                            </m:r>
+                          </m:e>
+                          <m:sub>
+                            <m:r>
+                              <a:rPr lang="en-US" b="0" i="1" smtClean="0">
+                                <a:latin typeface="Cambria Math" panose="02040503050406030204" pitchFamily="18" charset="0"/>
+                              </a:rPr>
+                              <m:t>0</m:t>
+                            </m:r>
+                          </m:sub>
+                        </m:sSub>
+                        <m:r>
+                          <a:rPr lang="en-US" b="0" i="1" smtClean="0">
+                            <a:latin typeface="Cambria Math" panose="02040503050406030204" pitchFamily="18" charset="0"/>
+                          </a:rPr>
+                          <m:t>+2</m:t>
+                        </m:r>
+                        <m:r>
+                          <a:rPr lang="en-US" b="0" i="1" smtClean="0">
+                            <a:latin typeface="Cambria Math" panose="02040503050406030204" pitchFamily="18" charset="0"/>
+                            <a:ea typeface="Cambria Math" panose="02040503050406030204" pitchFamily="18" charset="0"/>
+                          </a:rPr>
+                          <m:t>𝜋</m:t>
+                        </m:r>
+                        <m:r>
+                          <a:rPr lang="en-US" b="0" i="1" smtClean="0">
+                            <a:latin typeface="Cambria Math" panose="02040503050406030204" pitchFamily="18" charset="0"/>
+                            <a:ea typeface="Cambria Math" panose="02040503050406030204" pitchFamily="18" charset="0"/>
+                          </a:rPr>
+                          <m:t>(</m:t>
+                        </m:r>
+                        <m:f>
+                          <m:fPr>
+                            <m:ctrlPr>
+                              <a:rPr lang="en-US" b="0" i="1" smtClean="0">
+                                <a:latin typeface="Cambria Math" panose="02040503050406030204" pitchFamily="18" charset="0"/>
+                                <a:ea typeface="Cambria Math" panose="02040503050406030204" pitchFamily="18" charset="0"/>
+                              </a:rPr>
+                            </m:ctrlPr>
+                          </m:fPr>
+                          <m:num>
+                            <m:r>
+                              <a:rPr lang="en-US" b="0" i="1" smtClean="0">
+                                <a:latin typeface="Cambria Math" panose="02040503050406030204" pitchFamily="18" charset="0"/>
+                                <a:ea typeface="Cambria Math" panose="02040503050406030204" pitchFamily="18" charset="0"/>
+                              </a:rPr>
+                              <m:t>𝑐</m:t>
+                            </m:r>
+                          </m:num>
+                          <m:den>
+                            <m:r>
+                              <a:rPr lang="en-US" b="0" i="1" smtClean="0">
+                                <a:latin typeface="Cambria Math" panose="02040503050406030204" pitchFamily="18" charset="0"/>
+                                <a:ea typeface="Cambria Math" panose="02040503050406030204" pitchFamily="18" charset="0"/>
+                              </a:rPr>
+                              <m:t>2</m:t>
+                            </m:r>
+                          </m:den>
+                        </m:f>
+                        <m:sSup>
+                          <m:sSupPr>
+                            <m:ctrlPr>
+                              <a:rPr lang="en-US" b="0" i="1" smtClean="0">
+                                <a:latin typeface="Cambria Math" panose="02040503050406030204" pitchFamily="18" charset="0"/>
+                                <a:ea typeface="Cambria Math" panose="02040503050406030204" pitchFamily="18" charset="0"/>
+                              </a:rPr>
+                            </m:ctrlPr>
+                          </m:sSupPr>
+                          <m:e>
+                            <m:r>
+                              <a:rPr lang="en-US" b="0" i="1" smtClean="0">
+                                <a:latin typeface="Cambria Math" panose="02040503050406030204" pitchFamily="18" charset="0"/>
+                                <a:ea typeface="Cambria Math" panose="02040503050406030204" pitchFamily="18" charset="0"/>
+                              </a:rPr>
+                              <m:t>𝑡</m:t>
+                            </m:r>
+                          </m:e>
+                          <m:sup>
+                            <m:r>
+                              <a:rPr lang="en-US" b="0" i="1" smtClean="0">
+                                <a:latin typeface="Cambria Math" panose="02040503050406030204" pitchFamily="18" charset="0"/>
+                                <a:ea typeface="Cambria Math" panose="02040503050406030204" pitchFamily="18" charset="0"/>
+                              </a:rPr>
+                              <m:t>2</m:t>
+                            </m:r>
+                          </m:sup>
+                        </m:sSup>
+                        <m:r>
+                          <a:rPr lang="en-US" b="0" i="1" smtClean="0">
+                            <a:latin typeface="Cambria Math" panose="02040503050406030204" pitchFamily="18" charset="0"/>
+                            <a:ea typeface="Cambria Math" panose="02040503050406030204" pitchFamily="18" charset="0"/>
+                          </a:rPr>
+                          <m:t>+</m:t>
+                        </m:r>
+                        <m:sSub>
+                          <m:sSubPr>
+                            <m:ctrlPr>
+                              <a:rPr lang="en-US" b="0" i="1" smtClean="0">
+                                <a:latin typeface="Cambria Math" panose="02040503050406030204" pitchFamily="18" charset="0"/>
+                                <a:ea typeface="Cambria Math" panose="02040503050406030204" pitchFamily="18" charset="0"/>
+                              </a:rPr>
+                            </m:ctrlPr>
+                          </m:sSubPr>
+                          <m:e>
+                            <m:r>
+                              <a:rPr lang="en-US" b="0" i="1" smtClean="0">
+                                <a:latin typeface="Cambria Math" panose="02040503050406030204" pitchFamily="18" charset="0"/>
+                                <a:ea typeface="Cambria Math" panose="02040503050406030204" pitchFamily="18" charset="0"/>
+                              </a:rPr>
+                              <m:t>𝑓</m:t>
+                            </m:r>
+                          </m:e>
+                          <m:sub>
+                            <m:r>
+                              <a:rPr lang="en-US" b="0" i="1" smtClean="0">
+                                <a:latin typeface="Cambria Math" panose="02040503050406030204" pitchFamily="18" charset="0"/>
+                                <a:ea typeface="Cambria Math" panose="02040503050406030204" pitchFamily="18" charset="0"/>
+                              </a:rPr>
+                              <m:t>0</m:t>
+                            </m:r>
+                          </m:sub>
+                        </m:sSub>
+                        <m:r>
+                          <a:rPr lang="en-US" b="0" i="1" smtClean="0">
+                            <a:latin typeface="Cambria Math" panose="02040503050406030204" pitchFamily="18" charset="0"/>
+                            <a:ea typeface="Cambria Math" panose="02040503050406030204" pitchFamily="18" charset="0"/>
+                          </a:rPr>
+                          <m:t>𝑡</m:t>
+                        </m:r>
+                        <m:r>
+                          <a:rPr lang="en-US" b="0" i="1" smtClean="0">
+                            <a:latin typeface="Cambria Math" panose="02040503050406030204" pitchFamily="18" charset="0"/>
+                            <a:ea typeface="Cambria Math" panose="02040503050406030204" pitchFamily="18" charset="0"/>
+                          </a:rPr>
+                          <m:t>)]</m:t>
+                        </m:r>
+                      </m:e>
+                    </m:func>
+                  </m:oMath>
+                </a14:m>
+                <a:endParaRPr lang="en-US" dirty="0"/>
+              </a:p>
+            </p:txBody>
+          </p:sp>
+        </mc:Choice>
+        <mc:Fallback>
+          <p:sp>
+            <p:nvSpPr>
+              <p:cNvPr id="10" name="Content Placeholder 2">
+                <a:extLst>
+                  <a:ext uri="{FF2B5EF4-FFF2-40B4-BE49-F238E27FC236}">
+                    <a16:creationId xmlns:a16="http://schemas.microsoft.com/office/drawing/2014/main" id="{3B334B13-D5EE-4F81-B977-32938FCD9FD9}"/>
+                  </a:ext>
+                </a:extLst>
+              </p:cNvPr>
+              <p:cNvSpPr>
+                <a:spLocks noGrp="1" noRot="1" noChangeAspect="1" noMove="1" noResize="1" noEditPoints="1" noAdjustHandles="1" noChangeArrowheads="1" noChangeShapeType="1" noTextEdit="1"/>
+              </p:cNvSpPr>
+              <p:nvPr>
+                <p:ph idx="1"/>
+              </p:nvPr>
+            </p:nvSpPr>
+            <p:spPr>
+              <a:xfrm>
+                <a:off x="1066800" y="2103120"/>
+                <a:ext cx="10058400" cy="3849624"/>
+              </a:xfrm>
+              <a:blipFill>
+                <a:blip r:embed="rId4"/>
+                <a:stretch>
+                  <a:fillRect l="-182"/>
+                </a:stretch>
+              </a:blipFill>
+            </p:spPr>
+            <p:txBody>
+              <a:bodyPr/>
+              <a:lstStyle/>
+              <a:p>
+                <a:r>
+                  <a:rPr lang="en-US">
+                    <a:noFill/>
+                  </a:rPr>
+                  <a:t> </a:t>
+                </a:r>
+              </a:p>
+            </p:txBody>
+          </p:sp>
+        </mc:Fallback>
+      </mc:AlternateContent>
+      <p:pic>
+        <p:nvPicPr>
+          <p:cNvPr id="1026" name="Picture 2">
+            <a:extLst>
+              <a:ext uri="{FF2B5EF4-FFF2-40B4-BE49-F238E27FC236}">
+                <a16:creationId xmlns:a16="http://schemas.microsoft.com/office/drawing/2014/main" id="{E25D29AF-A2DA-4708-B81B-DE13F4A23FB9}"/>
+              </a:ext>
+            </a:extLst>
+          </p:cNvPr>
+          <p:cNvPicPr>
+            <a:picLocks noChangeAspect="1" noChangeArrowheads="1"/>
+          </p:cNvPicPr>
+          <p:nvPr/>
+        </p:nvPicPr>
+        <p:blipFill>
+          <a:blip r:embed="rId5">
+            <a:extLst>
+              <a:ext uri="{28A0092B-C50C-407E-A947-70E740481C1C}">
+                <a14:useLocalDpi xmlns:a14="http://schemas.microsoft.com/office/drawing/2010/main" val="0"/>
+              </a:ext>
+            </a:extLst>
+          </a:blip>
+          <a:srcRect/>
+          <a:stretch>
+            <a:fillRect/>
+          </a:stretch>
+        </p:blipFill>
+        <p:spPr bwMode="auto">
+          <a:xfrm>
+            <a:off x="8212748" y="700495"/>
+            <a:ext cx="2912452" cy="1948249"/>
+          </a:xfrm>
+          <a:prstGeom prst="rect">
+            <a:avLst/>
+          </a:prstGeom>
+          <a:noFill/>
+          <a:extLst>
+            <a:ext uri="{909E8E84-426E-40DD-AFC4-6F175D3DCCD1}">
+              <a14:hiddenFill xmlns:a14="http://schemas.microsoft.com/office/drawing/2010/main">
+                <a:solidFill>
+                  <a:srgbClr val="FFFFFF"/>
+                </a:solidFill>
+              </a14:hiddenFill>
+            </a:ext>
+          </a:extLst>
+        </p:spPr>
+      </p:pic>
+    </p:spTree>
+    <p:extLst>
+      <p:ext uri="{BB962C8B-B14F-4D97-AF65-F5344CB8AC3E}">
+        <p14:creationId xmlns:p14="http://schemas.microsoft.com/office/powerpoint/2010/main" val="3094054482"/>
+      </p:ext>
+    </p:extLst>
+  </p:cSld>
+  <p:clrMapOvr>
+    <a:masterClrMapping/>
+  </p:clrMapOvr>
+</p:sld>
+</file>
+
+<file path=ppt/slides/slide14.xml><?xml version="1.0" encoding="utf-8"?>
+<p:sld xmlns:a="http://schemas.openxmlformats.org/drawingml/2006/main" xmlns:r="http://schemas.openxmlformats.org/officeDocument/2006/relationships" xmlns:p="http://schemas.openxmlformats.org/presentationml/2006/main">
+  <p:cSld>
+    <p:spTree>
+      <p:nvGrpSpPr>
+        <p:cNvPr id="1" name=""/>
+        <p:cNvGrpSpPr/>
+        <p:nvPr/>
+      </p:nvGrpSpPr>
+      <p:grpSpPr>
+        <a:xfrm>
+          <a:off x="0" y="0"/>
+          <a:ext cx="0" cy="0"/>
+          <a:chOff x="0" y="0"/>
+          <a:chExt cx="0" cy="0"/>
+        </a:xfrm>
+      </p:grpSpPr>
+      <p:sp>
+        <p:nvSpPr>
+          <p:cNvPr id="2" name="Title 1">
+            <a:extLst>
+              <a:ext uri="{FF2B5EF4-FFF2-40B4-BE49-F238E27FC236}">
                 <a16:creationId xmlns:a16="http://schemas.microsoft.com/office/drawing/2014/main" id="{40B4AADA-B77D-4AAA-8C7A-AEB99A47F9D8}"/>
               </a:ext>
             </a:extLst>
@@ -5303,7 +5758,7 @@
 </p:sld>
 </file>
 
-<file path=ppt/slides/slide14.xml><?xml version="1.0" encoding="utf-8"?>
+<file path=ppt/slides/slide15.xml><?xml version="1.0" encoding="utf-8"?>
 <p:sld xmlns:a="http://schemas.openxmlformats.org/drawingml/2006/main" xmlns:r="http://schemas.openxmlformats.org/officeDocument/2006/relationships" xmlns:p="http://schemas.openxmlformats.org/presentationml/2006/main">
   <p:cSld>
     <p:spTree>
@@ -5466,7 +5921,7 @@
 </p:sld>
 </file>
 
-<file path=ppt/slides/slide15.xml><?xml version="1.0" encoding="utf-8"?>
+<file path=ppt/slides/slide16.xml><?xml version="1.0" encoding="utf-8"?>
 <p:sld xmlns:a="http://schemas.openxmlformats.org/drawingml/2006/main" xmlns:r="http://schemas.openxmlformats.org/officeDocument/2006/relationships" xmlns:p="http://schemas.openxmlformats.org/presentationml/2006/main">
   <p:cSld>
     <p:spTree>
@@ -5922,7 +6377,7 @@
 </p:sld>
 </file>
 
-<file path=ppt/slides/slide16.xml><?xml version="1.0" encoding="utf-8"?>
+<file path=ppt/slides/slide17.xml><?xml version="1.0" encoding="utf-8"?>
 <p:sld xmlns:a="http://schemas.openxmlformats.org/drawingml/2006/main" xmlns:r="http://schemas.openxmlformats.org/officeDocument/2006/relationships" xmlns:p="http://schemas.openxmlformats.org/presentationml/2006/main">
   <p:cSld>
     <p:spTree>
@@ -6142,7 +6597,7 @@
 </p:sld>
 </file>
 
-<file path=ppt/slides/slide17.xml><?xml version="1.0" encoding="utf-8"?>
+<file path=ppt/slides/slide18.xml><?xml version="1.0" encoding="utf-8"?>
 <p:sld xmlns:a="http://schemas.openxmlformats.org/drawingml/2006/main" xmlns:r="http://schemas.openxmlformats.org/officeDocument/2006/relationships" xmlns:p="http://schemas.openxmlformats.org/presentationml/2006/main">
   <p:cSld>
     <p:spTree>
@@ -6230,6 +6685,15 @@
               <a:rPr lang="en-US" dirty="0">
                 <a:hlinkClick r:id="rId4"/>
               </a:rPr>
+              <a:t>https://en.wikipedia.org/wiki/Chirp#/media/File:Linear-chirp.svg</a:t>
+            </a:r>
+            <a:endParaRPr lang="en-US" dirty="0"/>
+          </a:p>
+          <a:p>
+            <a:r>
+              <a:rPr lang="en-US" dirty="0">
+                <a:hlinkClick r:id="rId5"/>
+              </a:rPr>
               <a:t>https://en.wikipedia.org/wiki/Maximum_length_sequence#/media/File:MLS_shiftregisters_L4.png</a:t>
             </a:r>
             <a:endParaRPr lang="en-US" dirty="0"/>
@@ -6237,7 +6701,7 @@
           <a:p>
             <a:r>
               <a:rPr lang="en-US" dirty="0">
-                <a:hlinkClick r:id="rId5"/>
+                <a:hlinkClick r:id="rId6"/>
               </a:rPr>
               <a:t>https://i.stack.imgur.com/UOQnn.png</a:t>
             </a:r>
@@ -6268,105 +6732,6 @@
 </file>
 
 <file path=ppt/slides/slide2.xml><?xml version="1.0" encoding="utf-8"?>
-<p:sld xmlns:a="http://schemas.openxmlformats.org/drawingml/2006/main" xmlns:r="http://schemas.openxmlformats.org/officeDocument/2006/relationships" xmlns:p="http://schemas.openxmlformats.org/presentationml/2006/main">
-  <p:cSld>
-    <p:spTree>
-      <p:nvGrpSpPr>
-        <p:cNvPr id="1" name=""/>
-        <p:cNvGrpSpPr/>
-        <p:nvPr/>
-      </p:nvGrpSpPr>
-      <p:grpSpPr>
-        <a:xfrm>
-          <a:off x="0" y="0"/>
-          <a:ext cx="0" cy="0"/>
-          <a:chOff x="0" y="0"/>
-          <a:chExt cx="0" cy="0"/>
-        </a:xfrm>
-      </p:grpSpPr>
-      <p:sp>
-        <p:nvSpPr>
-          <p:cNvPr id="3" name="Content Placeholder 2">
-            <a:extLst>
-              <a:ext uri="{FF2B5EF4-FFF2-40B4-BE49-F238E27FC236}">
-                <a16:creationId xmlns:a16="http://schemas.microsoft.com/office/drawing/2014/main" id="{6279A3AF-D4AF-4C1C-8B2C-881CE9FBD4A6}"/>
-              </a:ext>
-            </a:extLst>
-          </p:cNvPr>
-          <p:cNvSpPr>
-            <a:spLocks noGrp="1"/>
-          </p:cNvSpPr>
-          <p:nvPr>
-            <p:ph idx="1"/>
-          </p:nvPr>
-        </p:nvSpPr>
-        <p:spPr>
-          <a:xfrm>
-            <a:off x="1066800" y="1884404"/>
-            <a:ext cx="10058400" cy="1622855"/>
-          </a:xfrm>
-        </p:spPr>
-        <p:txBody>
-          <a:bodyPr>
-            <a:noAutofit/>
-          </a:bodyPr>
-          <a:lstStyle/>
-          <a:p>
-            <a:pPr marL="0" indent="0" algn="ctr">
-              <a:buNone/>
-            </a:pPr>
-            <a:r>
-              <a:rPr lang="en-US" sz="2800" u="sng" dirty="0"/>
-              <a:t>Question</a:t>
-            </a:r>
-          </a:p>
-          <a:p>
-            <a:pPr marL="0" indent="0" algn="ctr">
-              <a:buNone/>
-            </a:pPr>
-            <a:endParaRPr lang="en-US" sz="2800" dirty="0"/>
-          </a:p>
-          <a:p>
-            <a:pPr marL="0" indent="0" algn="ctr">
-              <a:buNone/>
-            </a:pPr>
-            <a:r>
-              <a:rPr lang="en-US" sz="2800" i="1" dirty="0"/>
-              <a:t>How distinguishable are </a:t>
-            </a:r>
-            <a:r>
-              <a:rPr lang="en-US" sz="2800" b="1" i="1" dirty="0"/>
-              <a:t>doppler shifted</a:t>
-            </a:r>
-            <a:r>
-              <a:rPr lang="en-US" sz="2800" i="1" dirty="0"/>
-              <a:t> and </a:t>
-            </a:r>
-            <a:r>
-              <a:rPr lang="en-US" sz="2800" b="1" i="1" dirty="0"/>
-              <a:t>delayed</a:t>
-            </a:r>
-            <a:r>
-              <a:rPr lang="en-US" sz="2800" i="1" dirty="0"/>
-              <a:t> versions of a signal from the original signal?</a:t>
-            </a:r>
-          </a:p>
-        </p:txBody>
-      </p:sp>
-    </p:spTree>
-    <p:extLst>
-      <p:ext uri="{BB962C8B-B14F-4D97-AF65-F5344CB8AC3E}">
-        <p14:creationId xmlns:p14="http://schemas.microsoft.com/office/powerpoint/2010/main" val="833296744"/>
-      </p:ext>
-    </p:extLst>
-  </p:cSld>
-  <p:clrMapOvr>
-    <a:masterClrMapping/>
-  </p:clrMapOvr>
-</p:sld>
-</file>
-
-<file path=ppt/slides/slide3.xml><?xml version="1.0" encoding="utf-8"?>
 <p:sld xmlns:a="http://schemas.openxmlformats.org/drawingml/2006/main" xmlns:r="http://schemas.openxmlformats.org/officeDocument/2006/relationships" xmlns:p="http://schemas.openxmlformats.org/presentationml/2006/main">
   <p:cSld>
     <p:spTree>
@@ -6411,8 +6776,8 @@
           </a:p>
         </p:txBody>
       </p:sp>
-      <mc:AlternateContent xmlns:mc="http://schemas.openxmlformats.org/markup-compatibility/2006" xmlns:a14="http://schemas.microsoft.com/office/drawing/2010/main">
-        <mc:Choice Requires="a14">
+      <mc:AlternateContent xmlns:mc="http://schemas.openxmlformats.org/markup-compatibility/2006">
+        <mc:Choice xmlns:a14="http://schemas.microsoft.com/office/drawing/2010/main" Requires="a14">
           <p:sp>
             <p:nvSpPr>
               <p:cNvPr id="3" name="Content Placeholder 2">
@@ -6432,7 +6797,7 @@
             <p:spPr/>
             <p:txBody>
               <a:bodyPr>
-                <a:normAutofit/>
+                <a:normAutofit lnSpcReduction="10000"/>
               </a:bodyPr>
               <a:lstStyle/>
               <a:p>
@@ -6883,7 +7248,10 @@
                 <a:endParaRPr lang="en-US" dirty="0"/>
               </a:p>
               <a:p>
-                <a:endParaRPr lang="en-US" dirty="0"/>
+                <a:r>
+                  <a:rPr lang="en-US" dirty="0"/>
+                  <a:t>The type of pulse effects resolution and different detection properties.</a:t>
+                </a:r>
               </a:p>
               <a:p>
                 <a:endParaRPr lang="en-US" dirty="0"/>
@@ -6891,7 +7259,7 @@
             </p:txBody>
           </p:sp>
         </mc:Choice>
-        <mc:Fallback xmlns="">
+        <mc:Fallback>
           <p:sp>
             <p:nvSpPr>
               <p:cNvPr id="3" name="Content Placeholder 2">
@@ -6912,7 +7280,7 @@
               <a:blipFill>
                 <a:blip r:embed="rId2"/>
                 <a:stretch>
-                  <a:fillRect l="-182" t="-158"/>
+                  <a:fillRect l="-182" t="-158" b="-316"/>
                 </a:stretch>
               </a:blipFill>
             </p:spPr>
@@ -6953,7 +7321,7 @@
         </p:blipFill>
         <p:spPr>
           <a:xfrm>
-            <a:off x="7488194" y="2261654"/>
+            <a:off x="7389340" y="2265214"/>
             <a:ext cx="3067050" cy="1219200"/>
           </a:xfrm>
           <a:prstGeom prst="rect">
@@ -6983,7 +7351,7 @@
         </p:blipFill>
         <p:spPr>
           <a:xfrm>
-            <a:off x="7966137" y="3875147"/>
+            <a:off x="8561874" y="3870488"/>
             <a:ext cx="2360656" cy="2344918"/>
           </a:xfrm>
           <a:prstGeom prst="rect">
@@ -7475,6 +7843,113 @@
 </p:sld>
 </file>
 
+<file path=ppt/slides/slide3.xml><?xml version="1.0" encoding="utf-8"?>
+<p:sld xmlns:a="http://schemas.openxmlformats.org/drawingml/2006/main" xmlns:r="http://schemas.openxmlformats.org/officeDocument/2006/relationships" xmlns:p="http://schemas.openxmlformats.org/presentationml/2006/main">
+  <p:cSld>
+    <p:spTree>
+      <p:nvGrpSpPr>
+        <p:cNvPr id="1" name=""/>
+        <p:cNvGrpSpPr/>
+        <p:nvPr/>
+      </p:nvGrpSpPr>
+      <p:grpSpPr>
+        <a:xfrm>
+          <a:off x="0" y="0"/>
+          <a:ext cx="0" cy="0"/>
+          <a:chOff x="0" y="0"/>
+          <a:chExt cx="0" cy="0"/>
+        </a:xfrm>
+      </p:grpSpPr>
+      <p:sp>
+        <p:nvSpPr>
+          <p:cNvPr id="3" name="Content Placeholder 2">
+            <a:extLst>
+              <a:ext uri="{FF2B5EF4-FFF2-40B4-BE49-F238E27FC236}">
+                <a16:creationId xmlns:a16="http://schemas.microsoft.com/office/drawing/2014/main" id="{6279A3AF-D4AF-4C1C-8B2C-881CE9FBD4A6}"/>
+              </a:ext>
+            </a:extLst>
+          </p:cNvPr>
+          <p:cNvSpPr>
+            <a:spLocks noGrp="1"/>
+          </p:cNvSpPr>
+          <p:nvPr>
+            <p:ph idx="1"/>
+          </p:nvPr>
+        </p:nvSpPr>
+        <p:spPr>
+          <a:xfrm>
+            <a:off x="1066800" y="1884404"/>
+            <a:ext cx="10058400" cy="1622855"/>
+          </a:xfrm>
+        </p:spPr>
+        <p:txBody>
+          <a:bodyPr>
+            <a:noAutofit/>
+          </a:bodyPr>
+          <a:lstStyle/>
+          <a:p>
+            <a:pPr marL="0" indent="0" algn="ctr">
+              <a:buNone/>
+            </a:pPr>
+            <a:r>
+              <a:rPr lang="en-US" sz="2800" u="sng" dirty="0"/>
+              <a:t>Question</a:t>
+            </a:r>
+          </a:p>
+          <a:p>
+            <a:pPr marL="0" indent="0" algn="ctr">
+              <a:buNone/>
+            </a:pPr>
+            <a:endParaRPr lang="en-US" sz="2800" dirty="0"/>
+          </a:p>
+          <a:p>
+            <a:pPr marL="0" indent="0" algn="ctr">
+              <a:buNone/>
+            </a:pPr>
+            <a:r>
+              <a:rPr lang="en-US" sz="2800" i="1" dirty="0"/>
+              <a:t>How distinguishable are </a:t>
+            </a:r>
+            <a:r>
+              <a:rPr lang="en-US" sz="2800" b="1" i="1" dirty="0"/>
+              <a:t>doppler shifted</a:t>
+            </a:r>
+            <a:r>
+              <a:rPr lang="en-US" sz="2800" i="1" dirty="0"/>
+              <a:t> and </a:t>
+            </a:r>
+            <a:r>
+              <a:rPr lang="en-US" sz="2800" b="1" i="1" dirty="0"/>
+              <a:t>delayed</a:t>
+            </a:r>
+            <a:r>
+              <a:rPr lang="en-US" sz="2800" i="1" dirty="0"/>
+              <a:t> versions of a signal from </a:t>
+            </a:r>
+            <a:r>
+              <a:rPr lang="en-US" sz="2800" i="1" dirty="0" err="1"/>
+              <a:t>eachother</a:t>
+            </a:r>
+            <a:r>
+              <a:rPr lang="en-US" sz="2800" i="1" dirty="0"/>
+              <a:t>?</a:t>
+            </a:r>
+          </a:p>
+        </p:txBody>
+      </p:sp>
+    </p:spTree>
+    <p:extLst>
+      <p:ext uri="{BB962C8B-B14F-4D97-AF65-F5344CB8AC3E}">
+        <p14:creationId xmlns:p14="http://schemas.microsoft.com/office/powerpoint/2010/main" val="833296744"/>
+      </p:ext>
+    </p:extLst>
+  </p:cSld>
+  <p:clrMapOvr>
+    <a:masterClrMapping/>
+  </p:clrMapOvr>
+</p:sld>
+</file>
+
 <file path=ppt/slides/slide4.xml><?xml version="1.0" encoding="utf-8"?>
 <p:sld xmlns:a="http://schemas.openxmlformats.org/drawingml/2006/main" xmlns:r="http://schemas.openxmlformats.org/officeDocument/2006/relationships" xmlns:p="http://schemas.openxmlformats.org/presentationml/2006/main">
   <p:cSld>
@@ -7526,8 +8001,8 @@
           </a:p>
         </p:txBody>
       </p:sp>
-      <mc:AlternateContent xmlns:mc="http://schemas.openxmlformats.org/markup-compatibility/2006" xmlns:a14="http://schemas.microsoft.com/office/drawing/2010/main">
-        <mc:Choice Requires="a14">
+      <mc:AlternateContent xmlns:mc="http://schemas.openxmlformats.org/markup-compatibility/2006">
+        <mc:Choice xmlns:a14="http://schemas.microsoft.com/office/drawing/2010/main" Requires="a14">
           <p:sp>
             <p:nvSpPr>
               <p:cNvPr id="3" name="Content Placeholder 2">
@@ -7547,18 +8022,9 @@
             <p:spPr/>
             <p:txBody>
               <a:bodyPr>
-                <a:normAutofit fontScale="92500" lnSpcReduction="10000"/>
+                <a:normAutofit/>
               </a:bodyPr>
               <a:lstStyle/>
-              <a:p>
-                <a:r>
-                  <a:rPr lang="en-US" dirty="0"/>
-                  <a:t>The type of pulse effects resolution and different detection properties.</a:t>
-                </a:r>
-              </a:p>
-              <a:p>
-                <a:endParaRPr lang="en-US" dirty="0"/>
-              </a:p>
               <a:p>
                 <a:r>
                   <a:rPr lang="en-US" dirty="0"/>
@@ -8221,7 +8687,7 @@
             </p:txBody>
           </p:sp>
         </mc:Choice>
-        <mc:Fallback xmlns="">
+        <mc:Fallback>
           <p:sp>
             <p:nvSpPr>
               <p:cNvPr id="3" name="Content Placeholder 2">
@@ -8242,7 +8708,7 @@
               <a:blipFill>
                 <a:blip r:embed="rId2"/>
                 <a:stretch>
-                  <a:fillRect l="-121" t="-316" b="-2215"/>
+                  <a:fillRect l="-182" t="-158"/>
                 </a:stretch>
               </a:blipFill>
             </p:spPr>
@@ -8319,8 +8785,8 @@
           </a:p>
         </p:txBody>
       </p:sp>
-      <mc:AlternateContent xmlns:mc="http://schemas.openxmlformats.org/markup-compatibility/2006" xmlns:a14="http://schemas.microsoft.com/office/drawing/2010/main">
-        <mc:Choice Requires="a14">
+      <mc:AlternateContent xmlns:mc="http://schemas.openxmlformats.org/markup-compatibility/2006">
+        <mc:Choice xmlns:a14="http://schemas.microsoft.com/office/drawing/2010/main" Requires="a14">
           <p:sp>
             <p:nvSpPr>
               <p:cNvPr id="3" name="Content Placeholder 2">
@@ -8339,8 +8805,16 @@
             </p:nvSpPr>
             <p:spPr/>
             <p:txBody>
-              <a:bodyPr/>
+              <a:bodyPr>
+                <a:normAutofit fontScale="92500" lnSpcReduction="10000"/>
+              </a:bodyPr>
               <a:lstStyle/>
+              <a:p>
+                <a:r>
+                  <a:rPr lang="en-US" dirty="0"/>
+                  <a:t>The type of pulse effects resolution and different detection properties.</a:t>
+                </a:r>
+              </a:p>
               <a:p>
                 <a:r>
                   <a:rPr lang="en-US" dirty="0"/>
@@ -9034,7 +9508,7 @@
             </p:txBody>
           </p:sp>
         </mc:Choice>
-        <mc:Fallback xmlns="">
+        <mc:Fallback>
           <p:sp>
             <p:nvSpPr>
               <p:cNvPr id="3" name="Content Placeholder 2">
@@ -9055,7 +9529,7 @@
               <a:blipFill>
                 <a:blip r:embed="rId2"/>
                 <a:stretch>
-                  <a:fillRect l="-182" t="-158"/>
+                  <a:fillRect l="-121" t="-316" r="-424"/>
                 </a:stretch>
               </a:blipFill>
             </p:spPr>
@@ -9764,8 +10238,8 @@
           </a:p>
         </p:txBody>
       </p:sp>
-      <mc:AlternateContent xmlns:mc="http://schemas.openxmlformats.org/markup-compatibility/2006">
-        <mc:Choice xmlns:a14="http://schemas.microsoft.com/office/drawing/2010/main" Requires="a14">
+      <mc:AlternateContent xmlns:mc="http://schemas.openxmlformats.org/markup-compatibility/2006" xmlns:a14="http://schemas.microsoft.com/office/drawing/2010/main">
+        <mc:Choice Requires="a14">
           <p:sp>
             <p:nvSpPr>
               <p:cNvPr id="6" name="Content Placeholder 2">
@@ -10195,7 +10669,7 @@
             </p:txBody>
           </p:sp>
         </mc:Choice>
-        <mc:Fallback>
+        <mc:Fallback xmlns="">
           <p:sp>
             <p:nvSpPr>
               <p:cNvPr id="6" name="Content Placeholder 2">
@@ -10804,15 +11278,6 @@
 </file>
 
 <file path=customXml/item2.xml><?xml version="1.0" encoding="utf-8"?>
-<?mso-contentType ?>
-<FormTemplates xmlns="http://schemas.microsoft.com/sharepoint/v3/contenttype/forms">
-  <Display>DocumentLibraryForm</Display>
-  <Edit>DocumentLibraryForm</Edit>
-  <New>DocumentLibraryForm</New>
-</FormTemplates>
-</file>
-
-<file path=customXml/item3.xml><?xml version="1.0" encoding="utf-8"?>
 <ct:contentTypeSchema xmlns:ct="http://schemas.microsoft.com/office/2006/metadata/contentType" xmlns:ma="http://schemas.microsoft.com/office/2006/metadata/properties/metaAttributes" ct:_="" ma:_="" ma:contentTypeName="Document" ma:contentTypeID="0x01010079F111ED35F8CC479449609E8A0923A6" ma:contentTypeVersion="12" ma:contentTypeDescription="Create a new document." ma:contentTypeScope="" ma:versionID="a410dd7f93c95333ffa1b60ed6adedd1">
   <xsd:schema xmlns:xsd="http://www.w3.org/2001/XMLSchema" xmlns:xs="http://www.w3.org/2001/XMLSchema" xmlns:p="http://schemas.microsoft.com/office/2006/metadata/properties" xmlns:ns2="71af3243-3dd4-4a8d-8c0d-dd76da1f02a5" xmlns:ns3="16c05727-aa75-4e4a-9b5f-8a80a1165891" targetNamespace="http://schemas.microsoft.com/office/2006/metadata/properties" ma:root="true" ma:fieldsID="a936d9baba76aa3866493feff160faab" ns2:_="" ns3:_="">
     <xsd:import namespace="71af3243-3dd4-4a8d-8c0d-dd76da1f02a5"/>
@@ -11033,6 +11498,15 @@
 </ct:contentTypeSchema>
 </file>
 
+<file path=customXml/item3.xml><?xml version="1.0" encoding="utf-8"?>
+<?mso-contentType ?>
+<FormTemplates xmlns="http://schemas.microsoft.com/sharepoint/v3/contenttype/forms">
+  <Display>DocumentLibraryForm</Display>
+  <Edit>DocumentLibraryForm</Edit>
+  <New>DocumentLibraryForm</New>
+</FormTemplates>
+</file>
+
 <file path=customXml/itemProps1.xml><?xml version="1.0" encoding="utf-8"?>
 <ds:datastoreItem xmlns:ds="http://schemas.openxmlformats.org/officeDocument/2006/customXml" ds:itemID="{137651BA-F45C-4845-9AB3-E0A65B39F5E1}">
   <ds:schemaRefs>
@@ -11044,14 +11518,6 @@
 </file>
 
 <file path=customXml/itemProps2.xml><?xml version="1.0" encoding="utf-8"?>
-<ds:datastoreItem xmlns:ds="http://schemas.openxmlformats.org/officeDocument/2006/customXml" ds:itemID="{CDB58277-F8DF-46FF-84EC-EF41B835E69F}">
-  <ds:schemaRefs>
-    <ds:schemaRef ds:uri="http://schemas.microsoft.com/sharepoint/v3/contenttype/forms"/>
-  </ds:schemaRefs>
-</ds:datastoreItem>
-</file>
-
-<file path=customXml/itemProps3.xml><?xml version="1.0" encoding="utf-8"?>
 <ds:datastoreItem xmlns:ds="http://schemas.openxmlformats.org/officeDocument/2006/customXml" ds:itemID="{2D276E62-80A3-44DD-9BCC-97ED2B99B57F}">
   <ds:schemaRefs>
     <ds:schemaRef ds:uri="http://schemas.microsoft.com/office/2006/metadata/contentType"/>
@@ -11068,4 +11534,12 @@
     <ds:schemaRef ds:uri="http://schemas.microsoft.com/internal/obd"/>
   </ds:schemaRefs>
 </ds:datastoreItem>
+</file>
+
+<file path=customXml/itemProps3.xml><?xml version="1.0" encoding="utf-8"?>
+<ds:datastoreItem xmlns:ds="http://schemas.openxmlformats.org/officeDocument/2006/customXml" ds:itemID="{CDB58277-F8DF-46FF-84EC-EF41B835E69F}">
+  <ds:schemaRefs>
+    <ds:schemaRef ds:uri="http://schemas.microsoft.com/sharepoint/v3/contenttype/forms"/>
+  </ds:schemaRefs>
+</ds:datastoreItem>
 </file>
</xml_diff>

<commit_message>
Added colormap and contour. Updated presentation.
</commit_message>
<xml_diff>
--- a/The ambiguity function with applications.pptx
+++ b/The ambiguity function with applications.pptx
@@ -15,14 +15,17 @@
     <p:sldId id="265" r:id="rId12"/>
     <p:sldId id="266" r:id="rId13"/>
     <p:sldId id="273" r:id="rId14"/>
-    <p:sldId id="269" r:id="rId15"/>
-    <p:sldId id="271" r:id="rId16"/>
-    <p:sldId id="281" r:id="rId17"/>
-    <p:sldId id="267" r:id="rId18"/>
-    <p:sldId id="268" r:id="rId19"/>
-    <p:sldId id="270" r:id="rId20"/>
-    <p:sldId id="280" r:id="rId21"/>
-    <p:sldId id="278" r:id="rId22"/>
+    <p:sldId id="284" r:id="rId15"/>
+    <p:sldId id="283" r:id="rId16"/>
+    <p:sldId id="269" r:id="rId17"/>
+    <p:sldId id="271" r:id="rId18"/>
+    <p:sldId id="281" r:id="rId19"/>
+    <p:sldId id="267" r:id="rId20"/>
+    <p:sldId id="268" r:id="rId21"/>
+    <p:sldId id="270" r:id="rId22"/>
+    <p:sldId id="282" r:id="rId23"/>
+    <p:sldId id="280" r:id="rId24"/>
+    <p:sldId id="278" r:id="rId25"/>
   </p:sldIdLst>
   <p:sldSz cx="12192000" cy="6858000"/>
   <p:notesSz cx="6858000" cy="9144000"/>
@@ -598,7 +601,7 @@
           <a:p>
             <a:fld id="{EA0C0817-A112-4847-8014-A94B7D2A4EA3}" type="datetime1">
               <a:rPr lang="en-US" smtClean="0"/>
-              <a:t>3/12/2020</a:t>
+              <a:t>3/15/2020</a:t>
             </a:fld>
             <a:endParaRPr lang="en-US" dirty="0"/>
           </a:p>
@@ -800,7 +803,7 @@
           <a:p>
             <a:fld id="{7332B432-ACDA-4023-A761-2BAB76577B62}" type="datetime1">
               <a:rPr lang="en-US" smtClean="0"/>
-              <a:t>3/12/2020</a:t>
+              <a:t>3/15/2020</a:t>
             </a:fld>
             <a:endParaRPr lang="en-US" dirty="0"/>
           </a:p>
@@ -1399,7 +1402,7 @@
           <a:p>
             <a:fld id="{D9C646AA-F36E-4540-911D-FFFC0A0EF24A}" type="datetime1">
               <a:rPr lang="en-US" smtClean="0"/>
-              <a:t>3/12/2020</a:t>
+              <a:t>3/15/2020</a:t>
             </a:fld>
             <a:endParaRPr lang="en-US" dirty="0"/>
           </a:p>
@@ -1719,7 +1722,7 @@
           <a:p>
             <a:fld id="{69186D26-FA5F-4637-B602-B7C2DC34CFD4}" type="datetime1">
               <a:rPr lang="en-US" smtClean="0"/>
-              <a:t>3/12/2020</a:t>
+              <a:t>3/15/2020</a:t>
             </a:fld>
             <a:endParaRPr lang="en-US" dirty="0"/>
           </a:p>
@@ -2156,7 +2159,7 @@
           <a:p>
             <a:fld id="{8A7F15D8-96D1-4781-BC50-CA8A088B2FE4}" type="datetime1">
               <a:rPr lang="en-US" smtClean="0"/>
-              <a:t>3/12/2020</a:t>
+              <a:t>3/15/2020</a:t>
             </a:fld>
             <a:endParaRPr lang="en-US" dirty="0"/>
           </a:p>
@@ -2274,7 +2277,7 @@
           <a:p>
             <a:fld id="{F9A96C99-B8F8-4528-BD05-0E16E943DC09}" type="datetime1">
               <a:rPr lang="en-US" smtClean="0"/>
-              <a:t>3/12/2020</a:t>
+              <a:t>3/15/2020</a:t>
             </a:fld>
             <a:endParaRPr lang="en-US" dirty="0"/>
           </a:p>
@@ -2369,7 +2372,7 @@
           <a:p>
             <a:fld id="{03636942-C211-4B28-8DBD-C953E00AF71B}" type="datetime1">
               <a:rPr lang="en-US" smtClean="0"/>
-              <a:t>3/12/2020</a:t>
+              <a:t>3/15/2020</a:t>
             </a:fld>
             <a:endParaRPr lang="en-US" dirty="0"/>
           </a:p>
@@ -2786,7 +2789,7 @@
           <a:p>
             <a:fld id="{7E8D12A6-918A-48BD-8CB9-CA713993B0EA}" type="datetime1">
               <a:rPr lang="en-US" smtClean="0"/>
-              <a:t>3/12/2020</a:t>
+              <a:t>3/15/2020</a:t>
             </a:fld>
             <a:endParaRPr lang="en-US" dirty="0"/>
           </a:p>
@@ -3048,7 +3051,7 @@
             <a:fld id="{E778CE86-875F-4587-BCF6-FA054AFC0D53}" type="datetime1">
               <a:rPr lang="en-US" smtClean="0"/>
               <a:pPr/>
-              <a:t>3/12/2020</a:t>
+              <a:t>3/15/2020</a:t>
             </a:fld>
             <a:endParaRPr lang="en-US" dirty="0"/>
           </a:p>
@@ -3564,7 +3567,7 @@
           <a:p>
             <a:fld id="{F6FA2B21-3FCD-4721-B95C-427943F61125}" type="datetime1">
               <a:rPr lang="en-US" smtClean="0"/>
-              <a:t>3/12/2020</a:t>
+              <a:t>3/15/2020</a:t>
             </a:fld>
             <a:endParaRPr lang="en-US" dirty="0"/>
           </a:p>
@@ -4447,6 +4450,355 @@
           <p:cNvPr id="2" name="Title 1">
             <a:extLst>
               <a:ext uri="{FF2B5EF4-FFF2-40B4-BE49-F238E27FC236}">
+                <a16:creationId xmlns:a16="http://schemas.microsoft.com/office/drawing/2014/main" id="{BB665535-CA98-4ECA-BAC3-2E5CFEF6A082}"/>
+              </a:ext>
+            </a:extLst>
+          </p:cNvPr>
+          <p:cNvSpPr>
+            <a:spLocks noGrp="1"/>
+          </p:cNvSpPr>
+          <p:nvPr>
+            <p:ph type="title"/>
+          </p:nvPr>
+        </p:nvSpPr>
+        <p:spPr>
+          <a:xfrm>
+            <a:off x="1066800" y="642594"/>
+            <a:ext cx="10058400" cy="1371600"/>
+          </a:xfrm>
+        </p:spPr>
+        <p:txBody>
+          <a:bodyPr anchor="ctr">
+            <a:normAutofit/>
+          </a:bodyPr>
+          <a:lstStyle/>
+          <a:p>
+            <a:r>
+              <a:rPr lang="en-US" dirty="0"/>
+              <a:t>Colormap and Contour</a:t>
+            </a:r>
+          </a:p>
+        </p:txBody>
+      </p:sp>
+      <p:pic>
+        <p:nvPicPr>
+          <p:cNvPr id="11" name="Content Placeholder 10" descr="A flat screen television&#10;&#10;Description automatically generated">
+            <a:extLst>
+              <a:ext uri="{FF2B5EF4-FFF2-40B4-BE49-F238E27FC236}">
+                <a16:creationId xmlns:a16="http://schemas.microsoft.com/office/drawing/2014/main" id="{5FE2DECF-E742-4514-B1F7-3475DDD26D10}"/>
+              </a:ext>
+            </a:extLst>
+          </p:cNvPr>
+          <p:cNvPicPr>
+            <a:picLocks noGrp="1" noChangeAspect="1"/>
+          </p:cNvPicPr>
+          <p:nvPr>
+            <p:ph idx="1"/>
+          </p:nvPr>
+        </p:nvPicPr>
+        <p:blipFill>
+          <a:blip r:embed="rId2"/>
+          <a:stretch>
+            <a:fillRect/>
+          </a:stretch>
+        </p:blipFill>
+        <p:spPr>
+          <a:xfrm>
+            <a:off x="-159551" y="2282479"/>
+            <a:ext cx="5988402" cy="3849687"/>
+          </a:xfrm>
+        </p:spPr>
+      </p:pic>
+      <p:pic>
+        <p:nvPicPr>
+          <p:cNvPr id="15" name="Picture 14" descr="A screen shot of a computer monitor&#10;&#10;Description automatically generated">
+            <a:extLst>
+              <a:ext uri="{FF2B5EF4-FFF2-40B4-BE49-F238E27FC236}">
+                <a16:creationId xmlns:a16="http://schemas.microsoft.com/office/drawing/2014/main" id="{B5B50F68-EA89-4B9B-B58C-DB40FA1E223E}"/>
+              </a:ext>
+            </a:extLst>
+          </p:cNvPr>
+          <p:cNvPicPr>
+            <a:picLocks noChangeAspect="1"/>
+          </p:cNvPicPr>
+          <p:nvPr/>
+        </p:nvPicPr>
+        <p:blipFill>
+          <a:blip r:embed="rId3"/>
+          <a:stretch>
+            <a:fillRect/>
+          </a:stretch>
+        </p:blipFill>
+        <p:spPr>
+          <a:xfrm>
+            <a:off x="5614002" y="2833409"/>
+            <a:ext cx="6297511" cy="4048400"/>
+          </a:xfrm>
+          <a:prstGeom prst="rect">
+            <a:avLst/>
+          </a:prstGeom>
+        </p:spPr>
+      </p:pic>
+      <p:pic>
+        <p:nvPicPr>
+          <p:cNvPr id="17" name="Picture 16" descr="A close up of a logo&#10;&#10;Description automatically generated">
+            <a:extLst>
+              <a:ext uri="{FF2B5EF4-FFF2-40B4-BE49-F238E27FC236}">
+                <a16:creationId xmlns:a16="http://schemas.microsoft.com/office/drawing/2014/main" id="{8458034F-2514-4426-BF92-6A124E890DBA}"/>
+              </a:ext>
+            </a:extLst>
+          </p:cNvPr>
+          <p:cNvPicPr>
+            <a:picLocks noChangeAspect="1"/>
+          </p:cNvPicPr>
+          <p:nvPr/>
+        </p:nvPicPr>
+        <p:blipFill rotWithShape="1">
+          <a:blip r:embed="rId4"/>
+          <a:srcRect l="15905" t="25133" r="21808" b="13294"/>
+          <a:stretch/>
+        </p:blipFill>
+        <p:spPr>
+          <a:xfrm>
+            <a:off x="7324458" y="460623"/>
+            <a:ext cx="3322108" cy="3284026"/>
+          </a:xfrm>
+          <a:prstGeom prst="rect">
+            <a:avLst/>
+          </a:prstGeom>
+        </p:spPr>
+      </p:pic>
+      <p:sp>
+        <p:nvSpPr>
+          <p:cNvPr id="18" name="TextBox 17">
+            <a:extLst>
+              <a:ext uri="{FF2B5EF4-FFF2-40B4-BE49-F238E27FC236}">
+                <a16:creationId xmlns:a16="http://schemas.microsoft.com/office/drawing/2014/main" id="{79D8B1CC-BE59-4116-8AA6-ADE48C95900A}"/>
+              </a:ext>
+            </a:extLst>
+          </p:cNvPr>
+          <p:cNvSpPr txBox="1"/>
+          <p:nvPr/>
+        </p:nvSpPr>
+        <p:spPr>
+          <a:xfrm>
+            <a:off x="1445827" y="1841026"/>
+            <a:ext cx="8015417" cy="261610"/>
+          </a:xfrm>
+          <a:prstGeom prst="rect">
+            <a:avLst/>
+          </a:prstGeom>
+          <a:noFill/>
+        </p:spPr>
+        <p:txBody>
+          <a:bodyPr wrap="square" rtlCol="0">
+            <a:spAutoFit/>
+          </a:bodyPr>
+          <a:lstStyle/>
+          <a:p>
+            <a:r>
+              <a:rPr lang="en-US" sz="1100" i="1" dirty="0"/>
+              <a:t>Quadratic chirp ambiguity represented 3 ways.</a:t>
+            </a:r>
+            <a:endParaRPr lang="en-US" sz="1100" dirty="0"/>
+          </a:p>
+        </p:txBody>
+      </p:sp>
+    </p:spTree>
+    <p:extLst>
+      <p:ext uri="{BB962C8B-B14F-4D97-AF65-F5344CB8AC3E}">
+        <p14:creationId xmlns:p14="http://schemas.microsoft.com/office/powerpoint/2010/main" val="458322480"/>
+      </p:ext>
+    </p:extLst>
+  </p:cSld>
+  <p:clrMapOvr>
+    <a:masterClrMapping/>
+  </p:clrMapOvr>
+</p:sld>
+</file>
+
+<file path=ppt/slides/slide12.xml><?xml version="1.0" encoding="utf-8"?>
+<p:sld xmlns:a="http://schemas.openxmlformats.org/drawingml/2006/main" xmlns:r="http://schemas.openxmlformats.org/officeDocument/2006/relationships" xmlns:p="http://schemas.openxmlformats.org/presentationml/2006/main">
+  <p:cSld>
+    <p:spTree>
+      <p:nvGrpSpPr>
+        <p:cNvPr id="1" name=""/>
+        <p:cNvGrpSpPr/>
+        <p:nvPr/>
+      </p:nvGrpSpPr>
+      <p:grpSpPr>
+        <a:xfrm>
+          <a:off x="0" y="0"/>
+          <a:ext cx="0" cy="0"/>
+          <a:chOff x="0" y="0"/>
+          <a:chExt cx="0" cy="0"/>
+        </a:xfrm>
+      </p:grpSpPr>
+      <p:sp>
+        <p:nvSpPr>
+          <p:cNvPr id="2" name="Title 1">
+            <a:extLst>
+              <a:ext uri="{FF2B5EF4-FFF2-40B4-BE49-F238E27FC236}">
+                <a16:creationId xmlns:a16="http://schemas.microsoft.com/office/drawing/2014/main" id="{52E0204C-09EE-4A1A-BD17-797EF04D7C7B}"/>
+              </a:ext>
+            </a:extLst>
+          </p:cNvPr>
+          <p:cNvSpPr>
+            <a:spLocks noGrp="1"/>
+          </p:cNvSpPr>
+          <p:nvPr>
+            <p:ph type="title"/>
+          </p:nvPr>
+        </p:nvSpPr>
+        <p:spPr>
+          <a:xfrm>
+            <a:off x="1066800" y="642594"/>
+            <a:ext cx="10058400" cy="1371600"/>
+          </a:xfrm>
+        </p:spPr>
+        <p:txBody>
+          <a:bodyPr anchor="ctr">
+            <a:normAutofit/>
+          </a:bodyPr>
+          <a:lstStyle/>
+          <a:p>
+            <a:r>
+              <a:rPr lang="en-US" dirty="0"/>
+              <a:t>Slicing in time or frequency</a:t>
+            </a:r>
+          </a:p>
+        </p:txBody>
+      </p:sp>
+      <p:pic>
+        <p:nvPicPr>
+          <p:cNvPr id="11" name="Content Placeholder 10" descr="A screenshot of a social media post&#10;&#10;Description automatically generated">
+            <a:extLst>
+              <a:ext uri="{FF2B5EF4-FFF2-40B4-BE49-F238E27FC236}">
+                <a16:creationId xmlns:a16="http://schemas.microsoft.com/office/drawing/2014/main" id="{3D5D783D-F90C-4B29-8B24-57AB2380E6A5}"/>
+              </a:ext>
+            </a:extLst>
+          </p:cNvPr>
+          <p:cNvPicPr>
+            <a:picLocks noGrp="1" noChangeAspect="1"/>
+          </p:cNvPicPr>
+          <p:nvPr>
+            <p:ph idx="1"/>
+          </p:nvPr>
+        </p:nvPicPr>
+        <p:blipFill>
+          <a:blip r:embed="rId2"/>
+          <a:stretch>
+            <a:fillRect/>
+          </a:stretch>
+        </p:blipFill>
+        <p:spPr>
+          <a:xfrm>
+            <a:off x="6137275" y="2452688"/>
+            <a:ext cx="4946650" cy="3151188"/>
+          </a:xfrm>
+        </p:spPr>
+      </p:pic>
+      <p:pic>
+        <p:nvPicPr>
+          <p:cNvPr id="13" name="Picture 12" descr="A screenshot of a social media post&#10;&#10;Description automatically generated">
+            <a:extLst>
+              <a:ext uri="{FF2B5EF4-FFF2-40B4-BE49-F238E27FC236}">
+                <a16:creationId xmlns:a16="http://schemas.microsoft.com/office/drawing/2014/main" id="{78DEFCEB-B195-4AB1-984B-1AF173691FDD}"/>
+              </a:ext>
+            </a:extLst>
+          </p:cNvPr>
+          <p:cNvPicPr>
+            <a:picLocks noChangeAspect="1"/>
+          </p:cNvPicPr>
+          <p:nvPr/>
+        </p:nvPicPr>
+        <p:blipFill>
+          <a:blip r:embed="rId3"/>
+          <a:stretch>
+            <a:fillRect/>
+          </a:stretch>
+        </p:blipFill>
+        <p:spPr>
+          <a:xfrm>
+            <a:off x="1108075" y="2452688"/>
+            <a:ext cx="4946650" cy="3151188"/>
+          </a:xfrm>
+          <a:prstGeom prst="rect">
+            <a:avLst/>
+          </a:prstGeom>
+        </p:spPr>
+      </p:pic>
+      <p:sp>
+        <p:nvSpPr>
+          <p:cNvPr id="14" name="TextBox 13">
+            <a:extLst>
+              <a:ext uri="{FF2B5EF4-FFF2-40B4-BE49-F238E27FC236}">
+                <a16:creationId xmlns:a16="http://schemas.microsoft.com/office/drawing/2014/main" id="{98686E91-531A-4D21-9A34-EC0D63EEB10A}"/>
+              </a:ext>
+            </a:extLst>
+          </p:cNvPr>
+          <p:cNvSpPr txBox="1"/>
+          <p:nvPr/>
+        </p:nvSpPr>
+        <p:spPr>
+          <a:xfrm>
+            <a:off x="1445827" y="1841026"/>
+            <a:ext cx="8015417" cy="261610"/>
+          </a:xfrm>
+          <a:prstGeom prst="rect">
+            <a:avLst/>
+          </a:prstGeom>
+          <a:noFill/>
+        </p:spPr>
+        <p:txBody>
+          <a:bodyPr wrap="square" rtlCol="0">
+            <a:spAutoFit/>
+          </a:bodyPr>
+          <a:lstStyle/>
+          <a:p>
+            <a:r>
+              <a:rPr lang="en-US" sz="1100" i="1" dirty="0"/>
+              <a:t>Doppler and delay slice plots for a quadratic chirp.</a:t>
+            </a:r>
+            <a:endParaRPr lang="en-US" sz="1100" dirty="0"/>
+          </a:p>
+        </p:txBody>
+      </p:sp>
+    </p:spTree>
+    <p:extLst>
+      <p:ext uri="{BB962C8B-B14F-4D97-AF65-F5344CB8AC3E}">
+        <p14:creationId xmlns:p14="http://schemas.microsoft.com/office/powerpoint/2010/main" val="3588084891"/>
+      </p:ext>
+    </p:extLst>
+  </p:cSld>
+  <p:clrMapOvr>
+    <a:masterClrMapping/>
+  </p:clrMapOvr>
+</p:sld>
+</file>
+
+<file path=ppt/slides/slide13.xml><?xml version="1.0" encoding="utf-8"?>
+<p:sld xmlns:a="http://schemas.openxmlformats.org/drawingml/2006/main" xmlns:r="http://schemas.openxmlformats.org/officeDocument/2006/relationships" xmlns:p="http://schemas.openxmlformats.org/presentationml/2006/main">
+  <p:cSld>
+    <p:spTree>
+      <p:nvGrpSpPr>
+        <p:cNvPr id="1" name=""/>
+        <p:cNvGrpSpPr/>
+        <p:nvPr/>
+      </p:nvGrpSpPr>
+      <p:grpSpPr>
+        <a:xfrm>
+          <a:off x="0" y="0"/>
+          <a:ext cx="0" cy="0"/>
+          <a:chOff x="0" y="0"/>
+          <a:chExt cx="0" cy="0"/>
+        </a:xfrm>
+      </p:grpSpPr>
+      <p:sp>
+        <p:nvSpPr>
+          <p:cNvPr id="2" name="Title 1">
+            <a:extLst>
+              <a:ext uri="{FF2B5EF4-FFF2-40B4-BE49-F238E27FC236}">
                 <a16:creationId xmlns:a16="http://schemas.microsoft.com/office/drawing/2014/main" id="{9E6AEE2C-1D05-47AE-979E-4D9A2E05FD4E}"/>
               </a:ext>
             </a:extLst>
@@ -4641,7 +4993,7 @@
 </p:sld>
 </file>
 
-<file path=ppt/slides/slide12.xml><?xml version="1.0" encoding="utf-8"?>
+<file path=ppt/slides/slide14.xml><?xml version="1.0" encoding="utf-8"?>
 <p:sld xmlns:a="http://schemas.openxmlformats.org/drawingml/2006/main" xmlns:r="http://schemas.openxmlformats.org/officeDocument/2006/relationships" xmlns:p="http://schemas.openxmlformats.org/presentationml/2006/main">
   <p:cSld>
     <p:spTree>
@@ -5031,7 +5383,7 @@
 </p:sld>
 </file>
 
-<file path=ppt/slides/slide13.xml><?xml version="1.0" encoding="utf-8"?>
+<file path=ppt/slides/slide15.xml><?xml version="1.0" encoding="utf-8"?>
 <p:sld xmlns:a="http://schemas.openxmlformats.org/drawingml/2006/main" xmlns:r="http://schemas.openxmlformats.org/officeDocument/2006/relationships" xmlns:p="http://schemas.openxmlformats.org/presentationml/2006/main">
   <p:cSld>
     <p:spTree>
@@ -5098,7 +5450,7 @@
         </p:blipFill>
         <p:spPr>
           <a:xfrm>
-            <a:off x="6007202" y="2706645"/>
+            <a:off x="5636499" y="2846688"/>
             <a:ext cx="3910520" cy="3910520"/>
           </a:xfrm>
           <a:prstGeom prst="rect">
@@ -5128,7 +5480,7 @@
         </p:blipFill>
         <p:spPr>
           <a:xfrm>
-            <a:off x="2096682" y="2706645"/>
+            <a:off x="1066800" y="2846688"/>
             <a:ext cx="3910520" cy="3910520"/>
           </a:xfrm>
           <a:prstGeom prst="rect">
@@ -5136,8 +5488,8 @@
           </a:prstGeom>
         </p:spPr>
       </p:pic>
-      <mc:AlternateContent xmlns:mc="http://schemas.openxmlformats.org/markup-compatibility/2006">
-        <mc:Choice xmlns:a14="http://schemas.microsoft.com/office/drawing/2010/main" Requires="a14">
+      <mc:AlternateContent xmlns:mc="http://schemas.openxmlformats.org/markup-compatibility/2006" xmlns:a14="http://schemas.microsoft.com/office/drawing/2010/main">
+        <mc:Choice Requires="a14">
           <p:sp>
             <p:nvSpPr>
               <p:cNvPr id="10" name="Content Placeholder 2">
@@ -5170,7 +5522,7 @@
                       <a:rPr lang="en-US" b="0" i="1" smtClean="0">
                         <a:latin typeface="Cambria Math" panose="02040503050406030204" pitchFamily="18" charset="0"/>
                       </a:rPr>
-                      <m:t>𝐶</m:t>
+                      <m:t>𝐶h</m:t>
                     </m:r>
                     <m:d>
                       <m:dPr>
@@ -5378,10 +5730,103 @@
                 </a14:m>
                 <a:endParaRPr lang="en-US" dirty="0"/>
               </a:p>
+              <a:p>
+                <a14:m>
+                  <m:oMath xmlns:m="http://schemas.openxmlformats.org/officeDocument/2006/math">
+                    <m:r>
+                      <a:rPr lang="en-US" b="0" i="1" smtClean="0">
+                        <a:latin typeface="Cambria Math" panose="02040503050406030204" pitchFamily="18" charset="0"/>
+                      </a:rPr>
+                      <m:t>𝑐</m:t>
+                    </m:r>
+                    <m:r>
+                      <a:rPr lang="en-US" b="0" i="1" smtClean="0">
+                        <a:latin typeface="Cambria Math" panose="02040503050406030204" pitchFamily="18" charset="0"/>
+                        <a:ea typeface="Cambria Math" panose="02040503050406030204" pitchFamily="18" charset="0"/>
+                      </a:rPr>
+                      <m:t>≡</m:t>
+                    </m:r>
+                    <m:f>
+                      <m:fPr>
+                        <m:ctrlPr>
+                          <a:rPr lang="en-US" b="0" i="1" smtClean="0">
+                            <a:latin typeface="Cambria Math" panose="02040503050406030204" pitchFamily="18" charset="0"/>
+                          </a:rPr>
+                        </m:ctrlPr>
+                      </m:fPr>
+                      <m:num>
+                        <m:sSub>
+                          <m:sSubPr>
+                            <m:ctrlPr>
+                              <a:rPr lang="en-US" b="0" i="1" smtClean="0">
+                                <a:latin typeface="Cambria Math" panose="02040503050406030204" pitchFamily="18" charset="0"/>
+                              </a:rPr>
+                            </m:ctrlPr>
+                          </m:sSubPr>
+                          <m:e>
+                            <m:r>
+                              <a:rPr lang="en-US" b="0" i="1" smtClean="0">
+                                <a:latin typeface="Cambria Math" panose="02040503050406030204" pitchFamily="18" charset="0"/>
+                              </a:rPr>
+                              <m:t>𝑓</m:t>
+                            </m:r>
+                          </m:e>
+                          <m:sub>
+                            <m:r>
+                              <a:rPr lang="en-US" b="0" i="1" smtClean="0">
+                                <a:latin typeface="Cambria Math" panose="02040503050406030204" pitchFamily="18" charset="0"/>
+                              </a:rPr>
+                              <m:t>1−</m:t>
+                            </m:r>
+                          </m:sub>
+                        </m:sSub>
+                        <m:sSub>
+                          <m:sSubPr>
+                            <m:ctrlPr>
+                              <a:rPr lang="en-US" i="1">
+                                <a:latin typeface="Cambria Math" panose="02040503050406030204" pitchFamily="18" charset="0"/>
+                              </a:rPr>
+                            </m:ctrlPr>
+                          </m:sSubPr>
+                          <m:e>
+                            <m:r>
+                              <a:rPr lang="en-US" i="1">
+                                <a:latin typeface="Cambria Math" panose="02040503050406030204" pitchFamily="18" charset="0"/>
+                              </a:rPr>
+                              <m:t>𝑓</m:t>
+                            </m:r>
+                          </m:e>
+                          <m:sub>
+                            <m:r>
+                              <a:rPr lang="en-US" b="0" i="1" smtClean="0">
+                                <a:latin typeface="Cambria Math" panose="02040503050406030204" pitchFamily="18" charset="0"/>
+                              </a:rPr>
+                              <m:t>0</m:t>
+                            </m:r>
+                          </m:sub>
+                        </m:sSub>
+                      </m:num>
+                      <m:den>
+                        <m:r>
+                          <a:rPr lang="en-US" b="0" i="1" smtClean="0">
+                            <a:latin typeface="Cambria Math" panose="02040503050406030204" pitchFamily="18" charset="0"/>
+                            <a:ea typeface="Cambria Math" panose="02040503050406030204" pitchFamily="18" charset="0"/>
+                          </a:rPr>
+                          <m:t>𝜏</m:t>
+                        </m:r>
+                      </m:den>
+                    </m:f>
+                  </m:oMath>
+                </a14:m>
+                <a:r>
+                  <a:rPr lang="en-US" dirty="0"/>
+                  <a:t> : frequency range over duration.</a:t>
+                </a:r>
+              </a:p>
             </p:txBody>
           </p:sp>
         </mc:Choice>
-        <mc:Fallback>
+        <mc:Fallback xmlns="">
           <p:sp>
             <p:nvSpPr>
               <p:cNvPr id="10" name="Content Placeholder 2">
@@ -5454,7 +5899,7 @@
         </p:blipFill>
         <p:spPr bwMode="auto">
           <a:xfrm>
-            <a:off x="8212748" y="700495"/>
+            <a:off x="8212748" y="809513"/>
             <a:ext cx="2912452" cy="1948249"/>
           </a:xfrm>
           <a:prstGeom prst="rect">
@@ -5485,7 +5930,7 @@
 </p:sld>
 </file>
 
-<file path=ppt/slides/slide14.xml><?xml version="1.0" encoding="utf-8"?>
+<file path=ppt/slides/slide16.xml><?xml version="1.0" encoding="utf-8"?>
 <p:sld xmlns:a="http://schemas.openxmlformats.org/drawingml/2006/main" xmlns:r="http://schemas.openxmlformats.org/officeDocument/2006/relationships" xmlns:p="http://schemas.openxmlformats.org/presentationml/2006/main">
   <p:cSld>
     <p:spTree>
@@ -5758,7 +6203,7 @@
 </p:sld>
 </file>
 
-<file path=ppt/slides/slide15.xml><?xml version="1.0" encoding="utf-8"?>
+<file path=ppt/slides/slide17.xml><?xml version="1.0" encoding="utf-8"?>
 <p:sld xmlns:a="http://schemas.openxmlformats.org/drawingml/2006/main" xmlns:r="http://schemas.openxmlformats.org/officeDocument/2006/relationships" xmlns:p="http://schemas.openxmlformats.org/presentationml/2006/main">
   <p:cSld>
     <p:spTree>
@@ -5921,7 +6366,7 @@
 </p:sld>
 </file>
 
-<file path=ppt/slides/slide16.xml><?xml version="1.0" encoding="utf-8"?>
+<file path=ppt/slides/slide18.xml><?xml version="1.0" encoding="utf-8"?>
 <p:sld xmlns:a="http://schemas.openxmlformats.org/drawingml/2006/main" xmlns:r="http://schemas.openxmlformats.org/officeDocument/2006/relationships" xmlns:p="http://schemas.openxmlformats.org/presentationml/2006/main">
   <p:cSld>
     <p:spTree>
@@ -6377,7 +6822,7 @@
 </p:sld>
 </file>
 
-<file path=ppt/slides/slide17.xml><?xml version="1.0" encoding="utf-8"?>
+<file path=ppt/slides/slide19.xml><?xml version="1.0" encoding="utf-8"?>
 <p:sld xmlns:a="http://schemas.openxmlformats.org/drawingml/2006/main" xmlns:r="http://schemas.openxmlformats.org/officeDocument/2006/relationships" xmlns:p="http://schemas.openxmlformats.org/presentationml/2006/main">
   <p:cSld>
     <p:spTree>
@@ -6399,7 +6844,7 @@
           <p:cNvPr id="2" name="Title 1">
             <a:extLst>
               <a:ext uri="{FF2B5EF4-FFF2-40B4-BE49-F238E27FC236}">
-                <a16:creationId xmlns:a16="http://schemas.microsoft.com/office/drawing/2014/main" id="{132EB573-0E66-45F0-A4FC-076723A0840F}"/>
+                <a16:creationId xmlns:a16="http://schemas.microsoft.com/office/drawing/2014/main" id="{19005FCE-E61E-4270-B88F-0DA4C300D391}"/>
               </a:ext>
             </a:extLst>
           </p:cNvPr>
@@ -6417,7 +6862,7 @@
           <a:p>
             <a:r>
               <a:rPr lang="en-US" dirty="0"/>
-              <a:t>Project Code</a:t>
+              <a:t>PRN Code in GPS</a:t>
             </a:r>
           </a:p>
         </p:txBody>
@@ -6427,227 +6872,7 @@
           <p:cNvPr id="3" name="Content Placeholder 2">
             <a:extLst>
               <a:ext uri="{FF2B5EF4-FFF2-40B4-BE49-F238E27FC236}">
-                <a16:creationId xmlns:a16="http://schemas.microsoft.com/office/drawing/2014/main" id="{60F519DB-ED92-4D3E-B1EF-F3720783B150}"/>
-              </a:ext>
-            </a:extLst>
-          </p:cNvPr>
-          <p:cNvSpPr>
-            <a:spLocks noGrp="1"/>
-          </p:cNvSpPr>
-          <p:nvPr>
-            <p:ph idx="1"/>
-          </p:nvPr>
-        </p:nvSpPr>
-        <p:spPr/>
-        <p:txBody>
-          <a:bodyPr>
-            <a:normAutofit lnSpcReduction="10000"/>
-          </a:bodyPr>
-          <a:lstStyle/>
-          <a:p>
-            <a:r>
-              <a:rPr lang="en-US" dirty="0">
-                <a:hlinkClick r:id="rId2">
-                  <a:extLst>
-                    <a:ext uri="{A12FA001-AC4F-418D-AE19-62706E023703}">
-                      <ahyp:hlinkClr xmlns:ahyp="http://schemas.microsoft.com/office/drawing/2018/hyperlinkcolor" val="tx"/>
-                    </a:ext>
-                  </a:extLst>
-                </a:hlinkClick>
-              </a:rPr>
-              <a:t>https://github.com/efreneau/Ambiguity-Function</a:t>
-            </a:r>
-            <a:endParaRPr lang="en-US" dirty="0"/>
-          </a:p>
-          <a:p>
-            <a:endParaRPr lang="en-US" dirty="0"/>
-          </a:p>
-          <a:p>
-            <a:endParaRPr lang="en-US" dirty="0"/>
-          </a:p>
-          <a:p>
-            <a:endParaRPr lang="en-US" dirty="0"/>
-          </a:p>
-          <a:p>
-            <a:endParaRPr lang="en-US" dirty="0"/>
-          </a:p>
-          <a:p>
-            <a:endParaRPr lang="en-US" dirty="0"/>
-          </a:p>
-          <a:p>
-            <a:endParaRPr lang="en-US" dirty="0"/>
-          </a:p>
-          <a:p>
-            <a:endParaRPr lang="en-US" dirty="0"/>
-          </a:p>
-          <a:p>
-            <a:endParaRPr lang="en-US" dirty="0"/>
-          </a:p>
-          <a:p>
-            <a:endParaRPr lang="en-US" dirty="0"/>
-          </a:p>
-          <a:p>
-            <a:r>
-              <a:rPr lang="en-US" dirty="0"/>
-              <a:t>Some plots: </a:t>
-            </a:r>
-            <a:r>
-              <a:rPr lang="en-US" dirty="0">
-                <a:hlinkClick r:id="rId3">
-                  <a:extLst>
-                    <a:ext uri="{A12FA001-AC4F-418D-AE19-62706E023703}">
-                      <ahyp:hlinkClr xmlns:ahyp="http://schemas.microsoft.com/office/drawing/2018/hyperlinkcolor" val="tx"/>
-                    </a:ext>
-                  </a:extLst>
-                </a:hlinkClick>
-              </a:rPr>
-              <a:t>https://raw.githack.com/efreneau/Ambiguity-Function/master/Plots.html</a:t>
-            </a:r>
-            <a:endParaRPr lang="en-US" dirty="0"/>
-          </a:p>
-        </p:txBody>
-      </p:sp>
-      <p:pic>
-        <p:nvPicPr>
-          <p:cNvPr id="3076" name="Picture 4">
-            <a:extLst>
-              <a:ext uri="{FF2B5EF4-FFF2-40B4-BE49-F238E27FC236}">
-                <a16:creationId xmlns:a16="http://schemas.microsoft.com/office/drawing/2014/main" id="{2D8F6D47-A10F-4043-A9BD-FFFFE3D508F5}"/>
-              </a:ext>
-            </a:extLst>
-          </p:cNvPr>
-          <p:cNvPicPr>
-            <a:picLocks noChangeAspect="1" noChangeArrowheads="1"/>
-          </p:cNvPicPr>
-          <p:nvPr/>
-        </p:nvPicPr>
-        <p:blipFill>
-          <a:blip r:embed="rId4">
-            <a:extLst>
-              <a:ext uri="{28A0092B-C50C-407E-A947-70E740481C1C}">
-                <a14:useLocalDpi xmlns:a14="http://schemas.microsoft.com/office/drawing/2010/main" val="0"/>
-              </a:ext>
-            </a:extLst>
-          </a:blip>
-          <a:srcRect/>
-          <a:stretch>
-            <a:fillRect/>
-          </a:stretch>
-        </p:blipFill>
-        <p:spPr bwMode="auto">
-          <a:xfrm>
-            <a:off x="2715941" y="2928045"/>
-            <a:ext cx="2199774" cy="2199774"/>
-          </a:xfrm>
-          <a:prstGeom prst="rect">
-            <a:avLst/>
-          </a:prstGeom>
-          <a:noFill/>
-          <a:extLst>
-            <a:ext uri="{909E8E84-426E-40DD-AFC4-6F175D3DCCD1}">
-              <a14:hiddenFill xmlns:a14="http://schemas.microsoft.com/office/drawing/2010/main">
-                <a:solidFill>
-                  <a:srgbClr val="FFFFFF"/>
-                </a:solidFill>
-              </a14:hiddenFill>
-            </a:ext>
-          </a:extLst>
-        </p:spPr>
-      </p:pic>
-      <p:pic>
-        <p:nvPicPr>
-          <p:cNvPr id="7" name="Picture 6" descr="A close up of a logo&#10;&#10;Description automatically generated">
-            <a:extLst>
-              <a:ext uri="{FF2B5EF4-FFF2-40B4-BE49-F238E27FC236}">
-                <a16:creationId xmlns:a16="http://schemas.microsoft.com/office/drawing/2014/main" id="{97DC2CAA-ED27-40B0-9098-D113C1ECDC51}"/>
-              </a:ext>
-            </a:extLst>
-          </p:cNvPr>
-          <p:cNvPicPr>
-            <a:picLocks noChangeAspect="1"/>
-          </p:cNvPicPr>
-          <p:nvPr/>
-        </p:nvPicPr>
-        <p:blipFill>
-          <a:blip r:embed="rId5"/>
-          <a:stretch>
-            <a:fillRect/>
-          </a:stretch>
-        </p:blipFill>
-        <p:spPr>
-          <a:xfrm>
-            <a:off x="6483178" y="905256"/>
-            <a:ext cx="4786184" cy="4786184"/>
-          </a:xfrm>
-          <a:prstGeom prst="rect">
-            <a:avLst/>
-          </a:prstGeom>
-        </p:spPr>
-      </p:pic>
-    </p:spTree>
-    <p:extLst>
-      <p:ext uri="{BB962C8B-B14F-4D97-AF65-F5344CB8AC3E}">
-        <p14:creationId xmlns:p14="http://schemas.microsoft.com/office/powerpoint/2010/main" val="2558543000"/>
-      </p:ext>
-    </p:extLst>
-  </p:cSld>
-  <p:clrMapOvr>
-    <a:masterClrMapping/>
-  </p:clrMapOvr>
-</p:sld>
-</file>
-
-<file path=ppt/slides/slide18.xml><?xml version="1.0" encoding="utf-8"?>
-<p:sld xmlns:a="http://schemas.openxmlformats.org/drawingml/2006/main" xmlns:r="http://schemas.openxmlformats.org/officeDocument/2006/relationships" xmlns:p="http://schemas.openxmlformats.org/presentationml/2006/main">
-  <p:cSld>
-    <p:spTree>
-      <p:nvGrpSpPr>
-        <p:cNvPr id="1" name=""/>
-        <p:cNvGrpSpPr/>
-        <p:nvPr/>
-      </p:nvGrpSpPr>
-      <p:grpSpPr>
-        <a:xfrm>
-          <a:off x="0" y="0"/>
-          <a:ext cx="0" cy="0"/>
-          <a:chOff x="0" y="0"/>
-          <a:chExt cx="0" cy="0"/>
-        </a:xfrm>
-      </p:grpSpPr>
-      <p:sp>
-        <p:nvSpPr>
-          <p:cNvPr id="2" name="Title 1">
-            <a:extLst>
-              <a:ext uri="{FF2B5EF4-FFF2-40B4-BE49-F238E27FC236}">
-                <a16:creationId xmlns:a16="http://schemas.microsoft.com/office/drawing/2014/main" id="{00317EB5-47AC-4F6D-A855-A6899AA29D38}"/>
-              </a:ext>
-            </a:extLst>
-          </p:cNvPr>
-          <p:cNvSpPr>
-            <a:spLocks noGrp="1"/>
-          </p:cNvSpPr>
-          <p:nvPr>
-            <p:ph type="title"/>
-          </p:nvPr>
-        </p:nvSpPr>
-        <p:spPr/>
-        <p:txBody>
-          <a:bodyPr/>
-          <a:lstStyle/>
-          <a:p>
-            <a:r>
-              <a:rPr lang="en-US" dirty="0"/>
-              <a:t>Sources</a:t>
-            </a:r>
-          </a:p>
-        </p:txBody>
-      </p:sp>
-      <p:sp>
-        <p:nvSpPr>
-          <p:cNvPr id="3" name="Content Placeholder 2">
-            <a:extLst>
-              <a:ext uri="{FF2B5EF4-FFF2-40B4-BE49-F238E27FC236}">
-                <a16:creationId xmlns:a16="http://schemas.microsoft.com/office/drawing/2014/main" id="{9F764915-82F7-4597-BDE5-03257472D0DE}"/>
+                <a16:creationId xmlns:a16="http://schemas.microsoft.com/office/drawing/2014/main" id="{22DD2B19-C639-46A3-A64A-6B51F1A3FE86}"/>
               </a:ext>
             </a:extLst>
           </p:cNvPr>
@@ -6664,64 +6889,57 @@
           <a:lstStyle/>
           <a:p>
             <a:r>
-              <a:rPr lang="en-US" dirty="0">
-                <a:hlinkClick r:id="rId2"/>
-              </a:rPr>
-              <a:t>https://upload.wikimedia.org/wikipedia/commons/3/37/Radar_animation.gif</a:t>
+              <a:rPr lang="en-US" dirty="0"/>
+              <a:t>C/A Code in GPS is 1023-bit sequence (37 unique codes).</a:t>
+            </a:r>
+          </a:p>
+          <a:p>
+            <a:r>
+              <a:rPr lang="en-US" dirty="0"/>
+              <a:t>Each GPS satellite has its own </a:t>
+            </a:r>
+            <a:r>
+              <a:rPr lang="en-US"/>
+              <a:t>orthogonal code (31 in use as of 2020).</a:t>
             </a:r>
             <a:endParaRPr lang="en-US" dirty="0"/>
           </a:p>
-          <a:p>
-            <a:r>
-              <a:rPr lang="en-US" dirty="0">
-                <a:hlinkClick r:id="rId3"/>
-              </a:rPr>
-              <a:t>https://en.wikipedia.org/wiki/Doppler_effect#/media/File:Dopplereffectsourcemovingrightatmach0.7.gif</a:t>
-            </a:r>
-            <a:endParaRPr lang="en-US" dirty="0"/>
-          </a:p>
-          <a:p>
-            <a:r>
-              <a:rPr lang="en-US" dirty="0">
-                <a:hlinkClick r:id="rId4"/>
-              </a:rPr>
-              <a:t>https://en.wikipedia.org/wiki/Chirp#/media/File:Linear-chirp.svg</a:t>
-            </a:r>
-            <a:endParaRPr lang="en-US" dirty="0"/>
-          </a:p>
-          <a:p>
-            <a:r>
-              <a:rPr lang="en-US" dirty="0">
-                <a:hlinkClick r:id="rId5"/>
-              </a:rPr>
-              <a:t>https://en.wikipedia.org/wiki/Maximum_length_sequence#/media/File:MLS_shiftregisters_L4.png</a:t>
-            </a:r>
-            <a:endParaRPr lang="en-US" dirty="0"/>
-          </a:p>
-          <a:p>
-            <a:r>
-              <a:rPr lang="en-US" dirty="0">
-                <a:hlinkClick r:id="rId6"/>
-              </a:rPr>
-              <a:t>https://i.stack.imgur.com/UOQnn.png</a:t>
-            </a:r>
-            <a:endParaRPr lang="en-US" dirty="0"/>
-          </a:p>
-          <a:p>
-            <a:endParaRPr lang="en-US" dirty="0"/>
-          </a:p>
-          <a:p>
-            <a:endParaRPr lang="en-US" dirty="0"/>
-          </a:p>
-          <a:p>
-            <a:endParaRPr lang="en-US" dirty="0"/>
-          </a:p>
         </p:txBody>
       </p:sp>
+      <p:pic>
+        <p:nvPicPr>
+          <p:cNvPr id="5" name="Picture 4" descr="A close up of a piece of paper&#10;&#10;Description automatically generated">
+            <a:extLst>
+              <a:ext uri="{FF2B5EF4-FFF2-40B4-BE49-F238E27FC236}">
+                <a16:creationId xmlns:a16="http://schemas.microsoft.com/office/drawing/2014/main" id="{87551EAC-737A-4B1D-8D27-B4539AE9FDB3}"/>
+              </a:ext>
+            </a:extLst>
+          </p:cNvPr>
+          <p:cNvPicPr>
+            <a:picLocks noChangeAspect="1"/>
+          </p:cNvPicPr>
+          <p:nvPr/>
+        </p:nvPicPr>
+        <p:blipFill>
+          <a:blip r:embed="rId2"/>
+          <a:stretch>
+            <a:fillRect/>
+          </a:stretch>
+        </p:blipFill>
+        <p:spPr>
+          <a:xfrm>
+            <a:off x="6964426" y="2945619"/>
+            <a:ext cx="4678093" cy="3357091"/>
+          </a:xfrm>
+          <a:prstGeom prst="rect">
+            <a:avLst/>
+          </a:prstGeom>
+        </p:spPr>
+      </p:pic>
     </p:spTree>
     <p:extLst>
       <p:ext uri="{BB962C8B-B14F-4D97-AF65-F5344CB8AC3E}">
-        <p14:creationId xmlns:p14="http://schemas.microsoft.com/office/powerpoint/2010/main" val="3849864890"/>
+        <p14:creationId xmlns:p14="http://schemas.microsoft.com/office/powerpoint/2010/main" val="4073393182"/>
       </p:ext>
     </p:extLst>
   </p:cSld>
@@ -6776,8 +6994,8 @@
           </a:p>
         </p:txBody>
       </p:sp>
-      <mc:AlternateContent xmlns:mc="http://schemas.openxmlformats.org/markup-compatibility/2006">
-        <mc:Choice xmlns:a14="http://schemas.microsoft.com/office/drawing/2010/main" Requires="a14">
+      <mc:AlternateContent xmlns:mc="http://schemas.openxmlformats.org/markup-compatibility/2006" xmlns:a14="http://schemas.microsoft.com/office/drawing/2010/main">
+        <mc:Choice Requires="a14">
           <p:sp>
             <p:nvSpPr>
               <p:cNvPr id="3" name="Content Placeholder 2">
@@ -7259,7 +7477,7 @@
             </p:txBody>
           </p:sp>
         </mc:Choice>
-        <mc:Fallback>
+        <mc:Fallback xmlns="">
           <p:sp>
             <p:nvSpPr>
               <p:cNvPr id="3" name="Content Placeholder 2">
@@ -7843,6 +8061,360 @@
 </p:sld>
 </file>
 
+<file path=ppt/slides/slide20.xml><?xml version="1.0" encoding="utf-8"?>
+<p:sld xmlns:a="http://schemas.openxmlformats.org/drawingml/2006/main" xmlns:r="http://schemas.openxmlformats.org/officeDocument/2006/relationships" xmlns:p="http://schemas.openxmlformats.org/presentationml/2006/main">
+  <p:cSld>
+    <p:spTree>
+      <p:nvGrpSpPr>
+        <p:cNvPr id="1" name=""/>
+        <p:cNvGrpSpPr/>
+        <p:nvPr/>
+      </p:nvGrpSpPr>
+      <p:grpSpPr>
+        <a:xfrm>
+          <a:off x="0" y="0"/>
+          <a:ext cx="0" cy="0"/>
+          <a:chOff x="0" y="0"/>
+          <a:chExt cx="0" cy="0"/>
+        </a:xfrm>
+      </p:grpSpPr>
+      <p:sp>
+        <p:nvSpPr>
+          <p:cNvPr id="2" name="Title 1">
+            <a:extLst>
+              <a:ext uri="{FF2B5EF4-FFF2-40B4-BE49-F238E27FC236}">
+                <a16:creationId xmlns:a16="http://schemas.microsoft.com/office/drawing/2014/main" id="{132EB573-0E66-45F0-A4FC-076723A0840F}"/>
+              </a:ext>
+            </a:extLst>
+          </p:cNvPr>
+          <p:cNvSpPr>
+            <a:spLocks noGrp="1"/>
+          </p:cNvSpPr>
+          <p:nvPr>
+            <p:ph type="title"/>
+          </p:nvPr>
+        </p:nvSpPr>
+        <p:spPr/>
+        <p:txBody>
+          <a:bodyPr/>
+          <a:lstStyle/>
+          <a:p>
+            <a:r>
+              <a:rPr lang="en-US" dirty="0"/>
+              <a:t>Project Code</a:t>
+            </a:r>
+          </a:p>
+        </p:txBody>
+      </p:sp>
+      <p:sp>
+        <p:nvSpPr>
+          <p:cNvPr id="3" name="Content Placeholder 2">
+            <a:extLst>
+              <a:ext uri="{FF2B5EF4-FFF2-40B4-BE49-F238E27FC236}">
+                <a16:creationId xmlns:a16="http://schemas.microsoft.com/office/drawing/2014/main" id="{60F519DB-ED92-4D3E-B1EF-F3720783B150}"/>
+              </a:ext>
+            </a:extLst>
+          </p:cNvPr>
+          <p:cNvSpPr>
+            <a:spLocks noGrp="1"/>
+          </p:cNvSpPr>
+          <p:nvPr>
+            <p:ph idx="1"/>
+          </p:nvPr>
+        </p:nvSpPr>
+        <p:spPr/>
+        <p:txBody>
+          <a:bodyPr>
+            <a:normAutofit lnSpcReduction="10000"/>
+          </a:bodyPr>
+          <a:lstStyle/>
+          <a:p>
+            <a:r>
+              <a:rPr lang="en-US" dirty="0">
+                <a:hlinkClick r:id="rId2">
+                  <a:extLst>
+                    <a:ext uri="{A12FA001-AC4F-418D-AE19-62706E023703}">
+                      <ahyp:hlinkClr xmlns:ahyp="http://schemas.microsoft.com/office/drawing/2018/hyperlinkcolor" val="tx"/>
+                    </a:ext>
+                  </a:extLst>
+                </a:hlinkClick>
+              </a:rPr>
+              <a:t>https://github.com/efreneau/Ambiguity-Function</a:t>
+            </a:r>
+            <a:endParaRPr lang="en-US" dirty="0"/>
+          </a:p>
+          <a:p>
+            <a:endParaRPr lang="en-US" dirty="0"/>
+          </a:p>
+          <a:p>
+            <a:endParaRPr lang="en-US" dirty="0"/>
+          </a:p>
+          <a:p>
+            <a:endParaRPr lang="en-US" dirty="0"/>
+          </a:p>
+          <a:p>
+            <a:endParaRPr lang="en-US" dirty="0"/>
+          </a:p>
+          <a:p>
+            <a:endParaRPr lang="en-US" dirty="0"/>
+          </a:p>
+          <a:p>
+            <a:endParaRPr lang="en-US" dirty="0"/>
+          </a:p>
+          <a:p>
+            <a:endParaRPr lang="en-US" dirty="0"/>
+          </a:p>
+          <a:p>
+            <a:endParaRPr lang="en-US" dirty="0"/>
+          </a:p>
+          <a:p>
+            <a:endParaRPr lang="en-US" dirty="0"/>
+          </a:p>
+          <a:p>
+            <a:r>
+              <a:rPr lang="en-US" dirty="0"/>
+              <a:t>Some plots: </a:t>
+            </a:r>
+            <a:r>
+              <a:rPr lang="en-US" dirty="0">
+                <a:hlinkClick r:id="rId3">
+                  <a:extLst>
+                    <a:ext uri="{A12FA001-AC4F-418D-AE19-62706E023703}">
+                      <ahyp:hlinkClr xmlns:ahyp="http://schemas.microsoft.com/office/drawing/2018/hyperlinkcolor" val="tx"/>
+                    </a:ext>
+                  </a:extLst>
+                </a:hlinkClick>
+              </a:rPr>
+              <a:t>https://raw.githack.com/efreneau/Ambiguity-Function/master/Plots.html</a:t>
+            </a:r>
+            <a:endParaRPr lang="en-US" dirty="0"/>
+          </a:p>
+        </p:txBody>
+      </p:sp>
+      <p:pic>
+        <p:nvPicPr>
+          <p:cNvPr id="3076" name="Picture 4">
+            <a:extLst>
+              <a:ext uri="{FF2B5EF4-FFF2-40B4-BE49-F238E27FC236}">
+                <a16:creationId xmlns:a16="http://schemas.microsoft.com/office/drawing/2014/main" id="{2D8F6D47-A10F-4043-A9BD-FFFFE3D508F5}"/>
+              </a:ext>
+            </a:extLst>
+          </p:cNvPr>
+          <p:cNvPicPr>
+            <a:picLocks noChangeAspect="1" noChangeArrowheads="1"/>
+          </p:cNvPicPr>
+          <p:nvPr/>
+        </p:nvPicPr>
+        <p:blipFill>
+          <a:blip r:embed="rId4">
+            <a:extLst>
+              <a:ext uri="{28A0092B-C50C-407E-A947-70E740481C1C}">
+                <a14:useLocalDpi xmlns:a14="http://schemas.microsoft.com/office/drawing/2010/main" val="0"/>
+              </a:ext>
+            </a:extLst>
+          </a:blip>
+          <a:srcRect/>
+          <a:stretch>
+            <a:fillRect/>
+          </a:stretch>
+        </p:blipFill>
+        <p:spPr bwMode="auto">
+          <a:xfrm>
+            <a:off x="2715941" y="2928045"/>
+            <a:ext cx="2199774" cy="2199774"/>
+          </a:xfrm>
+          <a:prstGeom prst="rect">
+            <a:avLst/>
+          </a:prstGeom>
+          <a:noFill/>
+          <a:extLst>
+            <a:ext uri="{909E8E84-426E-40DD-AFC4-6F175D3DCCD1}">
+              <a14:hiddenFill xmlns:a14="http://schemas.microsoft.com/office/drawing/2010/main">
+                <a:solidFill>
+                  <a:srgbClr val="FFFFFF"/>
+                </a:solidFill>
+              </a14:hiddenFill>
+            </a:ext>
+          </a:extLst>
+        </p:spPr>
+      </p:pic>
+      <p:pic>
+        <p:nvPicPr>
+          <p:cNvPr id="7" name="Picture 6" descr="A close up of a logo&#10;&#10;Description automatically generated">
+            <a:extLst>
+              <a:ext uri="{FF2B5EF4-FFF2-40B4-BE49-F238E27FC236}">
+                <a16:creationId xmlns:a16="http://schemas.microsoft.com/office/drawing/2014/main" id="{97DC2CAA-ED27-40B0-9098-D113C1ECDC51}"/>
+              </a:ext>
+            </a:extLst>
+          </p:cNvPr>
+          <p:cNvPicPr>
+            <a:picLocks noChangeAspect="1"/>
+          </p:cNvPicPr>
+          <p:nvPr/>
+        </p:nvPicPr>
+        <p:blipFill>
+          <a:blip r:embed="rId5"/>
+          <a:stretch>
+            <a:fillRect/>
+          </a:stretch>
+        </p:blipFill>
+        <p:spPr>
+          <a:xfrm>
+            <a:off x="6483178" y="905256"/>
+            <a:ext cx="4786184" cy="4786184"/>
+          </a:xfrm>
+          <a:prstGeom prst="rect">
+            <a:avLst/>
+          </a:prstGeom>
+        </p:spPr>
+      </p:pic>
+    </p:spTree>
+    <p:extLst>
+      <p:ext uri="{BB962C8B-B14F-4D97-AF65-F5344CB8AC3E}">
+        <p14:creationId xmlns:p14="http://schemas.microsoft.com/office/powerpoint/2010/main" val="2558543000"/>
+      </p:ext>
+    </p:extLst>
+  </p:cSld>
+  <p:clrMapOvr>
+    <a:masterClrMapping/>
+  </p:clrMapOvr>
+</p:sld>
+</file>
+
+<file path=ppt/slides/slide21.xml><?xml version="1.0" encoding="utf-8"?>
+<p:sld xmlns:a="http://schemas.openxmlformats.org/drawingml/2006/main" xmlns:r="http://schemas.openxmlformats.org/officeDocument/2006/relationships" xmlns:p="http://schemas.openxmlformats.org/presentationml/2006/main">
+  <p:cSld>
+    <p:spTree>
+      <p:nvGrpSpPr>
+        <p:cNvPr id="1" name=""/>
+        <p:cNvGrpSpPr/>
+        <p:nvPr/>
+      </p:nvGrpSpPr>
+      <p:grpSpPr>
+        <a:xfrm>
+          <a:off x="0" y="0"/>
+          <a:ext cx="0" cy="0"/>
+          <a:chOff x="0" y="0"/>
+          <a:chExt cx="0" cy="0"/>
+        </a:xfrm>
+      </p:grpSpPr>
+      <p:sp>
+        <p:nvSpPr>
+          <p:cNvPr id="2" name="Title 1">
+            <a:extLst>
+              <a:ext uri="{FF2B5EF4-FFF2-40B4-BE49-F238E27FC236}">
+                <a16:creationId xmlns:a16="http://schemas.microsoft.com/office/drawing/2014/main" id="{00317EB5-47AC-4F6D-A855-A6899AA29D38}"/>
+              </a:ext>
+            </a:extLst>
+          </p:cNvPr>
+          <p:cNvSpPr>
+            <a:spLocks noGrp="1"/>
+          </p:cNvSpPr>
+          <p:nvPr>
+            <p:ph type="title"/>
+          </p:nvPr>
+        </p:nvSpPr>
+        <p:spPr/>
+        <p:txBody>
+          <a:bodyPr/>
+          <a:lstStyle/>
+          <a:p>
+            <a:r>
+              <a:rPr lang="en-US" dirty="0"/>
+              <a:t>Sources</a:t>
+            </a:r>
+          </a:p>
+        </p:txBody>
+      </p:sp>
+      <p:sp>
+        <p:nvSpPr>
+          <p:cNvPr id="3" name="Content Placeholder 2">
+            <a:extLst>
+              <a:ext uri="{FF2B5EF4-FFF2-40B4-BE49-F238E27FC236}">
+                <a16:creationId xmlns:a16="http://schemas.microsoft.com/office/drawing/2014/main" id="{9F764915-82F7-4597-BDE5-03257472D0DE}"/>
+              </a:ext>
+            </a:extLst>
+          </p:cNvPr>
+          <p:cNvSpPr>
+            <a:spLocks noGrp="1"/>
+          </p:cNvSpPr>
+          <p:nvPr>
+            <p:ph idx="1"/>
+          </p:nvPr>
+        </p:nvSpPr>
+        <p:spPr/>
+        <p:txBody>
+          <a:bodyPr/>
+          <a:lstStyle/>
+          <a:p>
+            <a:r>
+              <a:rPr lang="en-US" dirty="0">
+                <a:hlinkClick r:id="rId2"/>
+              </a:rPr>
+              <a:t>https://upload.wikimedia.org/wikipedia/commons/3/37/Radar_animation.gif</a:t>
+            </a:r>
+            <a:endParaRPr lang="en-US" dirty="0"/>
+          </a:p>
+          <a:p>
+            <a:r>
+              <a:rPr lang="en-US" dirty="0">
+                <a:hlinkClick r:id="rId3"/>
+              </a:rPr>
+              <a:t>https://en.wikipedia.org/wiki/Doppler_effect#/media/File:Dopplereffectsourcemovingrightatmach0.7.gif</a:t>
+            </a:r>
+            <a:endParaRPr lang="en-US" dirty="0"/>
+          </a:p>
+          <a:p>
+            <a:r>
+              <a:rPr lang="en-US" dirty="0">
+                <a:hlinkClick r:id="rId4"/>
+              </a:rPr>
+              <a:t>https://en.wikipedia.org/wiki/Chirp#/media/File:Linear-chirp.svg</a:t>
+            </a:r>
+            <a:endParaRPr lang="en-US" dirty="0"/>
+          </a:p>
+          <a:p>
+            <a:r>
+              <a:rPr lang="en-US" dirty="0">
+                <a:hlinkClick r:id="rId5"/>
+              </a:rPr>
+              <a:t>https://en.wikipedia.org/wiki/Maximum_length_sequence#/media/File:MLS_shiftregisters_L4.png</a:t>
+            </a:r>
+            <a:endParaRPr lang="en-US" dirty="0"/>
+          </a:p>
+          <a:p>
+            <a:r>
+              <a:rPr lang="en-US" dirty="0">
+                <a:hlinkClick r:id="rId6"/>
+              </a:rPr>
+              <a:t>https://i.stack.imgur.com/UOQnn.png</a:t>
+            </a:r>
+            <a:endParaRPr lang="en-US" dirty="0"/>
+          </a:p>
+          <a:p>
+            <a:endParaRPr lang="en-US" dirty="0"/>
+          </a:p>
+          <a:p>
+            <a:endParaRPr lang="en-US" dirty="0"/>
+          </a:p>
+          <a:p>
+            <a:endParaRPr lang="en-US" dirty="0"/>
+          </a:p>
+        </p:txBody>
+      </p:sp>
+    </p:spTree>
+    <p:extLst>
+      <p:ext uri="{BB962C8B-B14F-4D97-AF65-F5344CB8AC3E}">
+        <p14:creationId xmlns:p14="http://schemas.microsoft.com/office/powerpoint/2010/main" val="3849864890"/>
+      </p:ext>
+    </p:extLst>
+  </p:cSld>
+  <p:clrMapOvr>
+    <a:masterClrMapping/>
+  </p:clrMapOvr>
+</p:sld>
+</file>
+
 <file path=ppt/slides/slide3.xml><?xml version="1.0" encoding="utf-8"?>
 <p:sld xmlns:a="http://schemas.openxmlformats.org/drawingml/2006/main" xmlns:r="http://schemas.openxmlformats.org/officeDocument/2006/relationships" xmlns:p="http://schemas.openxmlformats.org/presentationml/2006/main">
   <p:cSld>
@@ -7924,15 +8496,7 @@
             </a:r>
             <a:r>
               <a:rPr lang="en-US" sz="2800" i="1" dirty="0"/>
-              <a:t> versions of a signal from </a:t>
-            </a:r>
-            <a:r>
-              <a:rPr lang="en-US" sz="2800" i="1" dirty="0" err="1"/>
-              <a:t>eachother</a:t>
-            </a:r>
-            <a:r>
-              <a:rPr lang="en-US" sz="2800" i="1" dirty="0"/>
-              <a:t>?</a:t>
+              <a:t> versions of a signal from each other?</a:t>
             </a:r>
           </a:p>
         </p:txBody>
@@ -8001,8 +8565,8 @@
           </a:p>
         </p:txBody>
       </p:sp>
-      <mc:AlternateContent xmlns:mc="http://schemas.openxmlformats.org/markup-compatibility/2006">
-        <mc:Choice xmlns:a14="http://schemas.microsoft.com/office/drawing/2010/main" Requires="a14">
+      <mc:AlternateContent xmlns:mc="http://schemas.openxmlformats.org/markup-compatibility/2006" xmlns:a14="http://schemas.microsoft.com/office/drawing/2010/main">
+        <mc:Choice Requires="a14">
           <p:sp>
             <p:nvSpPr>
               <p:cNvPr id="3" name="Content Placeholder 2">
@@ -8687,7 +9251,7 @@
             </p:txBody>
           </p:sp>
         </mc:Choice>
-        <mc:Fallback>
+        <mc:Fallback xmlns="">
           <p:sp>
             <p:nvSpPr>
               <p:cNvPr id="3" name="Content Placeholder 2">
@@ -8785,8 +9349,8 @@
           </a:p>
         </p:txBody>
       </p:sp>
-      <mc:AlternateContent xmlns:mc="http://schemas.openxmlformats.org/markup-compatibility/2006">
-        <mc:Choice xmlns:a14="http://schemas.microsoft.com/office/drawing/2010/main" Requires="a14">
+      <mc:AlternateContent xmlns:mc="http://schemas.openxmlformats.org/markup-compatibility/2006" xmlns:a14="http://schemas.microsoft.com/office/drawing/2010/main">
+        <mc:Choice Requires="a14">
           <p:sp>
             <p:nvSpPr>
               <p:cNvPr id="3" name="Content Placeholder 2">
@@ -8806,15 +9370,9 @@
             <p:spPr/>
             <p:txBody>
               <a:bodyPr>
-                <a:normAutofit fontScale="92500" lnSpcReduction="10000"/>
+                <a:noAutofit/>
               </a:bodyPr>
               <a:lstStyle/>
-              <a:p>
-                <a:r>
-                  <a:rPr lang="en-US" dirty="0"/>
-                  <a:t>The type of pulse effects resolution and different detection properties.</a:t>
-                </a:r>
-              </a:p>
               <a:p>
                 <a:r>
                   <a:rPr lang="en-US" dirty="0"/>
@@ -8822,21 +9380,13 @@
                 </a:r>
               </a:p>
               <a:p>
-                <a:pPr marL="0" indent="0">
-                  <a:buNone/>
-                </a:pPr>
-                <a:endParaRPr lang="en-US" i="1" dirty="0">
-                  <a:latin typeface="Cambria Math" panose="02040503050406030204" pitchFamily="18" charset="0"/>
-                </a:endParaRPr>
-              </a:p>
-              <a:p>
-                <a:pPr marL="0" indent="0">
+                <a:pPr marL="0" indent="0" algn="ctr">
                   <a:buNone/>
                 </a:pPr>
                 <a14:m>
                   <m:oMathPara xmlns:m="http://schemas.openxmlformats.org/officeDocument/2006/math">
                     <m:oMathParaPr>
-                      <m:jc m:val="center"/>
+                      <m:jc m:val="centerGroup"/>
                     </m:oMathParaPr>
                     <m:oMath xmlns:m="http://schemas.openxmlformats.org/officeDocument/2006/math">
                       <m:r>
@@ -9070,268 +9620,294 @@
                 <a:endParaRPr lang="en-US" dirty="0"/>
               </a:p>
               <a:p>
-                <a:pPr marL="0" indent="0">
+                <a:pPr marL="0" indent="0" algn="ctr">
                   <a:buNone/>
                 </a:pPr>
                 <a:r>
                   <a:rPr lang="en-US" dirty="0"/>
-                  <a:t>					        or</a:t>
+                  <a:t>or</a:t>
                 </a:r>
               </a:p>
               <a:p>
-                <a:pPr marL="0" indent="0">
+                <a:pPr marL="0" indent="0" algn="ctr">
                   <a:buNone/>
                 </a:pPr>
-                <a:r>
-                  <a:rPr lang="en-US" dirty="0"/>
-                  <a:t>   			             </a:t>
-                </a:r>
                 <a14:m>
-                  <m:oMath xmlns:m="http://schemas.openxmlformats.org/officeDocument/2006/math">
-                    <m:r>
-                      <a:rPr lang="en-US" i="1">
-                        <a:latin typeface="Cambria Math" panose="02040503050406030204" pitchFamily="18" charset="0"/>
-                      </a:rPr>
-                      <m:t>𝑋</m:t>
-                    </m:r>
-                    <m:d>
-                      <m:dPr>
-                        <m:ctrlPr>
-                          <a:rPr lang="en-US" i="1">
-                            <a:latin typeface="Cambria Math" panose="02040503050406030204" pitchFamily="18" charset="0"/>
-                          </a:rPr>
-                        </m:ctrlPr>
-                      </m:dPr>
-                      <m:e>
-                        <m:r>
-                          <a:rPr lang="en-US" i="1">
-                            <a:latin typeface="Cambria Math" panose="02040503050406030204" pitchFamily="18" charset="0"/>
-                            <a:ea typeface="Cambria Math" panose="02040503050406030204" pitchFamily="18" charset="0"/>
-                          </a:rPr>
-                          <m:t>𝜏</m:t>
-                        </m:r>
-                        <m:r>
-                          <a:rPr lang="en-US" i="1">
-                            <a:latin typeface="Cambria Math" panose="02040503050406030204" pitchFamily="18" charset="0"/>
-                            <a:ea typeface="Cambria Math" panose="02040503050406030204" pitchFamily="18" charset="0"/>
-                          </a:rPr>
-                          <m:t>,</m:t>
-                        </m:r>
-                        <m:r>
-                          <a:rPr lang="en-US" i="1">
-                            <a:latin typeface="Cambria Math" panose="02040503050406030204" pitchFamily="18" charset="0"/>
-                            <a:ea typeface="Cambria Math" panose="02040503050406030204" pitchFamily="18" charset="0"/>
-                          </a:rPr>
-                          <m:t>𝑓</m:t>
-                        </m:r>
-                        <m:r>
-                          <a:rPr lang="en-US" b="0" i="1" smtClean="0">
-                            <a:latin typeface="Cambria Math" panose="02040503050406030204" pitchFamily="18" charset="0"/>
-                            <a:ea typeface="Cambria Math" panose="02040503050406030204" pitchFamily="18" charset="0"/>
-                          </a:rPr>
-                          <m:t>′</m:t>
-                        </m:r>
-                      </m:e>
-                    </m:d>
-                    <m:r>
-                      <a:rPr lang="en-US" i="1">
-                        <a:latin typeface="Cambria Math" panose="02040503050406030204" pitchFamily="18" charset="0"/>
-                        <a:ea typeface="Cambria Math" panose="02040503050406030204" pitchFamily="18" charset="0"/>
-                      </a:rPr>
-                      <m:t>=</m:t>
-                    </m:r>
-                    <m:nary>
-                      <m:naryPr>
-                        <m:ctrlPr>
-                          <a:rPr lang="en-US" i="1">
-                            <a:latin typeface="Cambria Math" panose="02040503050406030204" pitchFamily="18" charset="0"/>
-                            <a:ea typeface="Cambria Math" panose="02040503050406030204" pitchFamily="18" charset="0"/>
-                          </a:rPr>
-                        </m:ctrlPr>
-                      </m:naryPr>
-                      <m:sub>
-                        <m:r>
-                          <m:rPr>
-                            <m:brk m:alnAt="23"/>
-                          </m:rPr>
-                          <a:rPr lang="en-US" i="1">
-                            <a:latin typeface="Cambria Math" panose="02040503050406030204" pitchFamily="18" charset="0"/>
-                            <a:ea typeface="Cambria Math" panose="02040503050406030204" pitchFamily="18" charset="0"/>
-                          </a:rPr>
-                          <m:t>∞</m:t>
-                        </m:r>
-                      </m:sub>
-                      <m:sup>
-                        <m:r>
-                          <a:rPr lang="en-US" i="1">
-                            <a:latin typeface="Cambria Math" panose="02040503050406030204" pitchFamily="18" charset="0"/>
-                            <a:ea typeface="Cambria Math" panose="02040503050406030204" pitchFamily="18" charset="0"/>
-                          </a:rPr>
-                          <m:t>∞</m:t>
-                        </m:r>
-                      </m:sup>
-                      <m:e>
-                        <m:r>
-                          <a:rPr lang="en-US" i="1">
-                            <a:latin typeface="Cambria Math" panose="02040503050406030204" pitchFamily="18" charset="0"/>
-                            <a:ea typeface="Cambria Math" panose="02040503050406030204" pitchFamily="18" charset="0"/>
-                          </a:rPr>
-                          <m:t>𝑆</m:t>
-                        </m:r>
-                        <m:r>
-                          <a:rPr lang="en-US" i="1">
-                            <a:latin typeface="Cambria Math" panose="02040503050406030204" pitchFamily="18" charset="0"/>
-                            <a:ea typeface="Cambria Math" panose="02040503050406030204" pitchFamily="18" charset="0"/>
-                          </a:rPr>
-                          <m:t>(</m:t>
-                        </m:r>
-                        <m:r>
-                          <a:rPr lang="en-US" b="0" i="1" smtClean="0">
-                            <a:latin typeface="Cambria Math" panose="02040503050406030204" pitchFamily="18" charset="0"/>
-                            <a:ea typeface="Cambria Math" panose="02040503050406030204" pitchFamily="18" charset="0"/>
-                          </a:rPr>
-                          <m:t>𝑓</m:t>
-                        </m:r>
-                        <m:r>
-                          <a:rPr lang="en-US" i="1">
-                            <a:latin typeface="Cambria Math" panose="02040503050406030204" pitchFamily="18" charset="0"/>
-                            <a:ea typeface="Cambria Math" panose="02040503050406030204" pitchFamily="18" charset="0"/>
-                          </a:rPr>
-                          <m:t>)∙</m:t>
-                        </m:r>
-                        <m:r>
-                          <a:rPr lang="en-US" b="0" i="1" smtClean="0">
-                            <a:latin typeface="Cambria Math" panose="02040503050406030204" pitchFamily="18" charset="0"/>
-                            <a:ea typeface="Cambria Math" panose="02040503050406030204" pitchFamily="18" charset="0"/>
-                          </a:rPr>
-                          <m:t>𝑆</m:t>
-                        </m:r>
-                        <m:r>
-                          <a:rPr lang="en-US" i="1">
-                            <a:latin typeface="Cambria Math" panose="02040503050406030204" pitchFamily="18" charset="0"/>
-                            <a:ea typeface="Cambria Math" panose="02040503050406030204" pitchFamily="18" charset="0"/>
-                          </a:rPr>
-                          <m:t>(</m:t>
-                        </m:r>
-                        <m:r>
-                          <a:rPr lang="en-US" b="0" i="1" smtClean="0">
-                            <a:latin typeface="Cambria Math" panose="02040503050406030204" pitchFamily="18" charset="0"/>
-                            <a:ea typeface="Cambria Math" panose="02040503050406030204" pitchFamily="18" charset="0"/>
-                          </a:rPr>
-                          <m:t>−</m:t>
-                        </m:r>
-                        <m:r>
-                          <a:rPr lang="en-US" b="0" i="1" smtClean="0">
-                            <a:latin typeface="Cambria Math" panose="02040503050406030204" pitchFamily="18" charset="0"/>
-                            <a:ea typeface="Cambria Math" panose="02040503050406030204" pitchFamily="18" charset="0"/>
-                          </a:rPr>
-                          <m:t>𝑓</m:t>
-                        </m:r>
-                        <m:r>
-                          <a:rPr lang="en-US" b="0" i="1" smtClean="0">
-                            <a:latin typeface="Cambria Math" panose="02040503050406030204" pitchFamily="18" charset="0"/>
-                            <a:ea typeface="Cambria Math" panose="02040503050406030204" pitchFamily="18" charset="0"/>
-                          </a:rPr>
-                          <m:t>−2</m:t>
-                        </m:r>
-                        <m:r>
-                          <a:rPr lang="en-US" b="0" i="1" smtClean="0">
-                            <a:latin typeface="Cambria Math" panose="02040503050406030204" pitchFamily="18" charset="0"/>
-                            <a:ea typeface="Cambria Math" panose="02040503050406030204" pitchFamily="18" charset="0"/>
-                          </a:rPr>
-                          <m:t>𝜋</m:t>
-                        </m:r>
-                        <m:r>
-                          <a:rPr lang="en-US" b="0" i="1" smtClean="0">
-                            <a:latin typeface="Cambria Math" panose="02040503050406030204" pitchFamily="18" charset="0"/>
-                            <a:ea typeface="Cambria Math" panose="02040503050406030204" pitchFamily="18" charset="0"/>
-                          </a:rPr>
-                          <m:t>𝑓</m:t>
-                        </m:r>
-                        <m:r>
-                          <a:rPr lang="en-US" b="0" i="1" smtClean="0">
-                            <a:latin typeface="Cambria Math" panose="02040503050406030204" pitchFamily="18" charset="0"/>
-                            <a:ea typeface="Cambria Math" panose="02040503050406030204" pitchFamily="18" charset="0"/>
-                          </a:rPr>
-                          <m:t>′)</m:t>
-                        </m:r>
-                        <m:sSup>
-                          <m:sSupPr>
-                            <m:ctrlPr>
-                              <a:rPr lang="en-US" i="1">
-                                <a:latin typeface="Cambria Math" panose="02040503050406030204" pitchFamily="18" charset="0"/>
-                                <a:ea typeface="Cambria Math" panose="02040503050406030204" pitchFamily="18" charset="0"/>
-                              </a:rPr>
-                            </m:ctrlPr>
-                          </m:sSupPr>
-                          <m:e>
-                            <m:r>
-                              <a:rPr lang="en-US" i="1">
-                                <a:latin typeface="Cambria Math" panose="02040503050406030204" pitchFamily="18" charset="0"/>
-                                <a:ea typeface="Cambria Math" panose="02040503050406030204" pitchFamily="18" charset="0"/>
-                              </a:rPr>
-                              <m:t>𝑒</m:t>
-                            </m:r>
-                          </m:e>
-                          <m:sup>
-                            <m:r>
-                              <a:rPr lang="en-US" i="1">
-                                <a:latin typeface="Cambria Math" panose="02040503050406030204" pitchFamily="18" charset="0"/>
-                                <a:ea typeface="Cambria Math" panose="02040503050406030204" pitchFamily="18" charset="0"/>
-                              </a:rPr>
-                              <m:t>𝑗</m:t>
-                            </m:r>
-                            <m:r>
-                              <a:rPr lang="en-US" i="1">
-                                <a:latin typeface="Cambria Math" panose="02040503050406030204" pitchFamily="18" charset="0"/>
-                                <a:ea typeface="Cambria Math" panose="02040503050406030204" pitchFamily="18" charset="0"/>
-                              </a:rPr>
-                              <m:t>2</m:t>
-                            </m:r>
-                            <m:r>
-                              <a:rPr lang="en-US" i="1">
-                                <a:latin typeface="Cambria Math" panose="02040503050406030204" pitchFamily="18" charset="0"/>
-                                <a:ea typeface="Cambria Math" panose="02040503050406030204" pitchFamily="18" charset="0"/>
-                              </a:rPr>
-                              <m:t>𝜋</m:t>
-                            </m:r>
-                            <m:r>
-                              <a:rPr lang="en-US" i="1">
-                                <a:latin typeface="Cambria Math" panose="02040503050406030204" pitchFamily="18" charset="0"/>
-                                <a:ea typeface="Cambria Math" panose="02040503050406030204" pitchFamily="18" charset="0"/>
-                              </a:rPr>
-                              <m:t>𝑓</m:t>
-                            </m:r>
-                            <m:r>
-                              <a:rPr lang="en-US" b="0" i="1" smtClean="0">
-                                <a:latin typeface="Cambria Math" panose="02040503050406030204" pitchFamily="18" charset="0"/>
-                                <a:ea typeface="Cambria Math" panose="02040503050406030204" pitchFamily="18" charset="0"/>
-                              </a:rPr>
-                              <m:t>𝜏</m:t>
-                            </m:r>
-                          </m:sup>
-                        </m:sSup>
-                      </m:e>
-                    </m:nary>
-                    <m:r>
-                      <a:rPr lang="en-US" i="1">
-                        <a:latin typeface="Cambria Math" panose="02040503050406030204" pitchFamily="18" charset="0"/>
-                        <a:ea typeface="Cambria Math" panose="02040503050406030204" pitchFamily="18" charset="0"/>
-                      </a:rPr>
-                      <m:t>𝑑</m:t>
-                    </m:r>
-                    <m:r>
-                      <a:rPr lang="en-US" b="0" i="1" smtClean="0">
-                        <a:latin typeface="Cambria Math" panose="02040503050406030204" pitchFamily="18" charset="0"/>
-                        <a:ea typeface="Cambria Math" panose="02040503050406030204" pitchFamily="18" charset="0"/>
-                      </a:rPr>
-                      <m:t>𝑓</m:t>
-                    </m:r>
-                  </m:oMath>
+                  <m:oMathPara xmlns:m="http://schemas.openxmlformats.org/officeDocument/2006/math">
+                    <m:oMathParaPr>
+                      <m:jc m:val="centerGroup"/>
+                    </m:oMathParaPr>
+                    <m:oMath xmlns:m="http://schemas.openxmlformats.org/officeDocument/2006/math">
+                      <m:r>
+                        <a:rPr lang="en-US" i="1">
+                          <a:latin typeface="Cambria Math" panose="02040503050406030204" pitchFamily="18" charset="0"/>
+                        </a:rPr>
+                        <m:t>𝑋</m:t>
+                      </m:r>
+                      <m:d>
+                        <m:dPr>
+                          <m:ctrlPr>
+                            <a:rPr lang="en-US" i="1">
+                              <a:latin typeface="Cambria Math" panose="02040503050406030204" pitchFamily="18" charset="0"/>
+                            </a:rPr>
+                          </m:ctrlPr>
+                        </m:dPr>
+                        <m:e>
+                          <m:r>
+                            <a:rPr lang="en-US" i="1">
+                              <a:latin typeface="Cambria Math" panose="02040503050406030204" pitchFamily="18" charset="0"/>
+                              <a:ea typeface="Cambria Math" panose="02040503050406030204" pitchFamily="18" charset="0"/>
+                            </a:rPr>
+                            <m:t>𝜏</m:t>
+                          </m:r>
+                          <m:r>
+                            <a:rPr lang="en-US" i="1">
+                              <a:latin typeface="Cambria Math" panose="02040503050406030204" pitchFamily="18" charset="0"/>
+                              <a:ea typeface="Cambria Math" panose="02040503050406030204" pitchFamily="18" charset="0"/>
+                            </a:rPr>
+                            <m:t>,</m:t>
+                          </m:r>
+                          <m:r>
+                            <a:rPr lang="en-US" i="1">
+                              <a:latin typeface="Cambria Math" panose="02040503050406030204" pitchFamily="18" charset="0"/>
+                              <a:ea typeface="Cambria Math" panose="02040503050406030204" pitchFamily="18" charset="0"/>
+                            </a:rPr>
+                            <m:t>𝑓</m:t>
+                          </m:r>
+                          <m:r>
+                            <a:rPr lang="en-US" b="0" i="1" smtClean="0">
+                              <a:latin typeface="Cambria Math" panose="02040503050406030204" pitchFamily="18" charset="0"/>
+                              <a:ea typeface="Cambria Math" panose="02040503050406030204" pitchFamily="18" charset="0"/>
+                            </a:rPr>
+                            <m:t>′</m:t>
+                          </m:r>
+                        </m:e>
+                      </m:d>
+                      <m:r>
+                        <a:rPr lang="en-US" i="1">
+                          <a:latin typeface="Cambria Math" panose="02040503050406030204" pitchFamily="18" charset="0"/>
+                          <a:ea typeface="Cambria Math" panose="02040503050406030204" pitchFamily="18" charset="0"/>
+                        </a:rPr>
+                        <m:t>=</m:t>
+                      </m:r>
+                      <m:nary>
+                        <m:naryPr>
+                          <m:ctrlPr>
+                            <a:rPr lang="en-US" i="1">
+                              <a:latin typeface="Cambria Math" panose="02040503050406030204" pitchFamily="18" charset="0"/>
+                              <a:ea typeface="Cambria Math" panose="02040503050406030204" pitchFamily="18" charset="0"/>
+                            </a:rPr>
+                          </m:ctrlPr>
+                        </m:naryPr>
+                        <m:sub>
+                          <m:r>
+                            <m:rPr>
+                              <m:brk m:alnAt="23"/>
+                            </m:rPr>
+                            <a:rPr lang="en-US" i="1">
+                              <a:latin typeface="Cambria Math" panose="02040503050406030204" pitchFamily="18" charset="0"/>
+                              <a:ea typeface="Cambria Math" panose="02040503050406030204" pitchFamily="18" charset="0"/>
+                            </a:rPr>
+                            <m:t>∞</m:t>
+                          </m:r>
+                        </m:sub>
+                        <m:sup>
+                          <m:r>
+                            <a:rPr lang="en-US" i="1">
+                              <a:latin typeface="Cambria Math" panose="02040503050406030204" pitchFamily="18" charset="0"/>
+                              <a:ea typeface="Cambria Math" panose="02040503050406030204" pitchFamily="18" charset="0"/>
+                            </a:rPr>
+                            <m:t>∞</m:t>
+                          </m:r>
+                        </m:sup>
+                        <m:e>
+                          <m:r>
+                            <a:rPr lang="en-US" i="1">
+                              <a:latin typeface="Cambria Math" panose="02040503050406030204" pitchFamily="18" charset="0"/>
+                              <a:ea typeface="Cambria Math" panose="02040503050406030204" pitchFamily="18" charset="0"/>
+                            </a:rPr>
+                            <m:t>𝑆</m:t>
+                          </m:r>
+                          <m:r>
+                            <a:rPr lang="en-US" i="1">
+                              <a:latin typeface="Cambria Math" panose="02040503050406030204" pitchFamily="18" charset="0"/>
+                              <a:ea typeface="Cambria Math" panose="02040503050406030204" pitchFamily="18" charset="0"/>
+                            </a:rPr>
+                            <m:t>(</m:t>
+                          </m:r>
+                          <m:r>
+                            <a:rPr lang="en-US" b="0" i="1" smtClean="0">
+                              <a:latin typeface="Cambria Math" panose="02040503050406030204" pitchFamily="18" charset="0"/>
+                              <a:ea typeface="Cambria Math" panose="02040503050406030204" pitchFamily="18" charset="0"/>
+                            </a:rPr>
+                            <m:t>𝑓</m:t>
+                          </m:r>
+                          <m:r>
+                            <a:rPr lang="en-US" i="1">
+                              <a:latin typeface="Cambria Math" panose="02040503050406030204" pitchFamily="18" charset="0"/>
+                              <a:ea typeface="Cambria Math" panose="02040503050406030204" pitchFamily="18" charset="0"/>
+                            </a:rPr>
+                            <m:t>)∙</m:t>
+                          </m:r>
+                          <m:sSup>
+                            <m:sSupPr>
+                              <m:ctrlPr>
+                                <a:rPr lang="en-US" i="1">
+                                  <a:latin typeface="Cambria Math" panose="02040503050406030204" pitchFamily="18" charset="0"/>
+                                  <a:ea typeface="Cambria Math" panose="02040503050406030204" pitchFamily="18" charset="0"/>
+                                </a:rPr>
+                              </m:ctrlPr>
+                            </m:sSupPr>
+                            <m:e>
+                              <m:r>
+                                <a:rPr lang="en-US" i="1">
+                                  <a:latin typeface="Cambria Math" panose="02040503050406030204" pitchFamily="18" charset="0"/>
+                                  <a:ea typeface="Cambria Math" panose="02040503050406030204" pitchFamily="18" charset="0"/>
+                                </a:rPr>
+                                <m:t>𝑆</m:t>
+                              </m:r>
+                            </m:e>
+                            <m:sup>
+                              <m:r>
+                                <a:rPr lang="en-US" i="1">
+                                  <a:latin typeface="Cambria Math" panose="02040503050406030204" pitchFamily="18" charset="0"/>
+                                  <a:ea typeface="Cambria Math" panose="02040503050406030204" pitchFamily="18" charset="0"/>
+                                </a:rPr>
+                                <m:t>∗</m:t>
+                              </m:r>
+                            </m:sup>
+                          </m:sSup>
+                          <m:r>
+                            <a:rPr lang="en-US" i="1">
+                              <a:latin typeface="Cambria Math" panose="02040503050406030204" pitchFamily="18" charset="0"/>
+                              <a:ea typeface="Cambria Math" panose="02040503050406030204" pitchFamily="18" charset="0"/>
+                            </a:rPr>
+                            <m:t>(</m:t>
+                          </m:r>
+                          <m:r>
+                            <a:rPr lang="en-US" b="0" i="1" smtClean="0">
+                              <a:latin typeface="Cambria Math" panose="02040503050406030204" pitchFamily="18" charset="0"/>
+                              <a:ea typeface="Cambria Math" panose="02040503050406030204" pitchFamily="18" charset="0"/>
+                            </a:rPr>
+                            <m:t>−</m:t>
+                          </m:r>
+                          <m:r>
+                            <a:rPr lang="en-US" b="0" i="1" smtClean="0">
+                              <a:latin typeface="Cambria Math" panose="02040503050406030204" pitchFamily="18" charset="0"/>
+                              <a:ea typeface="Cambria Math" panose="02040503050406030204" pitchFamily="18" charset="0"/>
+                            </a:rPr>
+                            <m:t>𝑓</m:t>
+                          </m:r>
+                          <m:r>
+                            <a:rPr lang="en-US" i="1">
+                              <a:latin typeface="Cambria Math" panose="02040503050406030204" pitchFamily="18" charset="0"/>
+                              <a:ea typeface="Cambria Math" panose="02040503050406030204" pitchFamily="18" charset="0"/>
+                            </a:rPr>
+                            <m:t>−</m:t>
+                          </m:r>
+                          <m:r>
+                            <a:rPr lang="en-US" b="0" i="1" smtClean="0">
+                              <a:latin typeface="Cambria Math" panose="02040503050406030204" pitchFamily="18" charset="0"/>
+                              <a:ea typeface="Cambria Math" panose="02040503050406030204" pitchFamily="18" charset="0"/>
+                            </a:rPr>
+                            <m:t>2</m:t>
+                          </m:r>
+                          <m:r>
+                            <a:rPr lang="en-US" i="1">
+                              <a:latin typeface="Cambria Math" panose="02040503050406030204" pitchFamily="18" charset="0"/>
+                              <a:ea typeface="Cambria Math" panose="02040503050406030204" pitchFamily="18" charset="0"/>
+                            </a:rPr>
+                            <m:t>𝜋</m:t>
+                          </m:r>
+                          <m:r>
+                            <a:rPr lang="en-US" i="1">
+                              <a:latin typeface="Cambria Math" panose="02040503050406030204" pitchFamily="18" charset="0"/>
+                              <a:ea typeface="Cambria Math" panose="02040503050406030204" pitchFamily="18" charset="0"/>
+                            </a:rPr>
+                            <m:t>𝑓</m:t>
+                          </m:r>
+                          <m:r>
+                            <a:rPr lang="en-US" i="1">
+                              <a:latin typeface="Cambria Math" panose="02040503050406030204" pitchFamily="18" charset="0"/>
+                              <a:ea typeface="Cambria Math" panose="02040503050406030204" pitchFamily="18" charset="0"/>
+                            </a:rPr>
+                            <m:t>′)</m:t>
+                          </m:r>
+                          <m:sSup>
+                            <m:sSupPr>
+                              <m:ctrlPr>
+                                <a:rPr lang="en-US" i="1">
+                                  <a:latin typeface="Cambria Math" panose="02040503050406030204" pitchFamily="18" charset="0"/>
+                                  <a:ea typeface="Cambria Math" panose="02040503050406030204" pitchFamily="18" charset="0"/>
+                                </a:rPr>
+                              </m:ctrlPr>
+                            </m:sSupPr>
+                            <m:e>
+                              <m:r>
+                                <a:rPr lang="en-US" i="1">
+                                  <a:latin typeface="Cambria Math" panose="02040503050406030204" pitchFamily="18" charset="0"/>
+                                  <a:ea typeface="Cambria Math" panose="02040503050406030204" pitchFamily="18" charset="0"/>
+                                </a:rPr>
+                                <m:t>𝑒</m:t>
+                              </m:r>
+                            </m:e>
+                            <m:sup>
+                              <m:r>
+                                <a:rPr lang="en-US" i="1">
+                                  <a:latin typeface="Cambria Math" panose="02040503050406030204" pitchFamily="18" charset="0"/>
+                                  <a:ea typeface="Cambria Math" panose="02040503050406030204" pitchFamily="18" charset="0"/>
+                                </a:rPr>
+                                <m:t>𝑗</m:t>
+                              </m:r>
+                              <m:r>
+                                <a:rPr lang="en-US" i="1">
+                                  <a:latin typeface="Cambria Math" panose="02040503050406030204" pitchFamily="18" charset="0"/>
+                                  <a:ea typeface="Cambria Math" panose="02040503050406030204" pitchFamily="18" charset="0"/>
+                                </a:rPr>
+                                <m:t>2</m:t>
+                              </m:r>
+                              <m:r>
+                                <a:rPr lang="en-US" i="1">
+                                  <a:latin typeface="Cambria Math" panose="02040503050406030204" pitchFamily="18" charset="0"/>
+                                  <a:ea typeface="Cambria Math" panose="02040503050406030204" pitchFamily="18" charset="0"/>
+                                </a:rPr>
+                                <m:t>𝜋</m:t>
+                              </m:r>
+                              <m:r>
+                                <a:rPr lang="en-US" i="1">
+                                  <a:latin typeface="Cambria Math" panose="02040503050406030204" pitchFamily="18" charset="0"/>
+                                  <a:ea typeface="Cambria Math" panose="02040503050406030204" pitchFamily="18" charset="0"/>
+                                </a:rPr>
+                                <m:t>𝑓</m:t>
+                              </m:r>
+                              <m:r>
+                                <a:rPr lang="en-US" i="1">
+                                  <a:latin typeface="Cambria Math" panose="02040503050406030204" pitchFamily="18" charset="0"/>
+                                  <a:ea typeface="Cambria Math" panose="02040503050406030204" pitchFamily="18" charset="0"/>
+                                </a:rPr>
+                                <m:t>𝜏</m:t>
+                              </m:r>
+                            </m:sup>
+                          </m:sSup>
+                        </m:e>
+                      </m:nary>
+                      <m:r>
+                        <a:rPr lang="en-US" i="1">
+                          <a:latin typeface="Cambria Math" panose="02040503050406030204" pitchFamily="18" charset="0"/>
+                          <a:ea typeface="Cambria Math" panose="02040503050406030204" pitchFamily="18" charset="0"/>
+                        </a:rPr>
+                        <m:t>𝑑</m:t>
+                      </m:r>
+                      <m:r>
+                        <a:rPr lang="en-US" b="0" i="1" smtClean="0">
+                          <a:latin typeface="Cambria Math" panose="02040503050406030204" pitchFamily="18" charset="0"/>
+                          <a:ea typeface="Cambria Math" panose="02040503050406030204" pitchFamily="18" charset="0"/>
+                        </a:rPr>
+                        <m:t>𝑓</m:t>
+                      </m:r>
+                    </m:oMath>
+                  </m:oMathPara>
                 </a14:m>
-                <a:endParaRPr lang="en-US" dirty="0"/>
-              </a:p>
-              <a:p>
                 <a:endParaRPr lang="en-US" dirty="0"/>
               </a:p>
               <a:p>
@@ -9363,152 +9939,162 @@
                 </a:r>
               </a:p>
               <a:p>
-                <a:pPr marL="0" indent="0">
+                <a:endParaRPr lang="en-US" dirty="0"/>
+              </a:p>
+              <a:p>
+                <a:pPr marL="0" indent="0" algn="ctr">
+                  <a:buNone/>
+                </a:pPr>
+                <a14:m>
+                  <m:oMathPara xmlns:m="http://schemas.openxmlformats.org/officeDocument/2006/math">
+                    <m:oMathParaPr>
+                      <m:jc m:val="centerGroup"/>
+                    </m:oMathParaPr>
+                    <m:oMath xmlns:m="http://schemas.openxmlformats.org/officeDocument/2006/math">
+                      <m:sSub>
+                        <m:sSubPr>
+                          <m:ctrlPr>
+                            <a:rPr lang="en-US" i="1">
+                              <a:latin typeface="Cambria Math" panose="02040503050406030204" pitchFamily="18" charset="0"/>
+                            </a:rPr>
+                          </m:ctrlPr>
+                        </m:sSubPr>
+                        <m:e>
+                          <m:r>
+                            <a:rPr lang="en-US" i="1">
+                              <a:latin typeface="Cambria Math" panose="02040503050406030204" pitchFamily="18" charset="0"/>
+                            </a:rPr>
+                            <m:t>𝑅</m:t>
+                          </m:r>
+                        </m:e>
+                        <m:sub>
+                          <m:r>
+                            <a:rPr lang="en-US" i="1">
+                              <a:latin typeface="Cambria Math" panose="02040503050406030204" pitchFamily="18" charset="0"/>
+                            </a:rPr>
+                            <m:t>𝑋𝑋</m:t>
+                          </m:r>
+                        </m:sub>
+                      </m:sSub>
+                      <m:d>
+                        <m:dPr>
+                          <m:ctrlPr>
+                            <a:rPr lang="en-US" i="1">
+                              <a:latin typeface="Cambria Math" panose="02040503050406030204" pitchFamily="18" charset="0"/>
+                            </a:rPr>
+                          </m:ctrlPr>
+                        </m:dPr>
+                        <m:e>
+                          <m:r>
+                            <a:rPr lang="en-US" i="1">
+                              <a:latin typeface="Cambria Math" panose="02040503050406030204" pitchFamily="18" charset="0"/>
+                              <a:ea typeface="Cambria Math" panose="02040503050406030204" pitchFamily="18" charset="0"/>
+                            </a:rPr>
+                            <m:t>𝜏</m:t>
+                          </m:r>
+                        </m:e>
+                      </m:d>
+                      <m:r>
+                        <a:rPr lang="en-US" b="0" i="1" smtClean="0">
+                          <a:latin typeface="Cambria Math" panose="02040503050406030204" pitchFamily="18" charset="0"/>
+                          <a:ea typeface="Cambria Math" panose="02040503050406030204" pitchFamily="18" charset="0"/>
+                        </a:rPr>
+                        <m:t>=</m:t>
+                      </m:r>
+                      <m:r>
+                        <a:rPr lang="en-US" i="1">
+                          <a:latin typeface="Cambria Math" panose="02040503050406030204" pitchFamily="18" charset="0"/>
+                        </a:rPr>
+                        <m:t>𝑋</m:t>
+                      </m:r>
+                      <m:d>
+                        <m:dPr>
+                          <m:ctrlPr>
+                            <a:rPr lang="en-US" i="1">
+                              <a:latin typeface="Cambria Math" panose="02040503050406030204" pitchFamily="18" charset="0"/>
+                            </a:rPr>
+                          </m:ctrlPr>
+                        </m:dPr>
+                        <m:e>
+                          <m:r>
+                            <a:rPr lang="en-US" i="1">
+                              <a:latin typeface="Cambria Math" panose="02040503050406030204" pitchFamily="18" charset="0"/>
+                              <a:ea typeface="Cambria Math" panose="02040503050406030204" pitchFamily="18" charset="0"/>
+                            </a:rPr>
+                            <m:t>𝜏</m:t>
+                          </m:r>
+                          <m:r>
+                            <a:rPr lang="en-US" i="1">
+                              <a:latin typeface="Cambria Math" panose="02040503050406030204" pitchFamily="18" charset="0"/>
+                              <a:ea typeface="Cambria Math" panose="02040503050406030204" pitchFamily="18" charset="0"/>
+                            </a:rPr>
+                            <m:t>,</m:t>
+                          </m:r>
+                          <m:r>
+                            <a:rPr lang="en-US" i="1">
+                              <a:latin typeface="Cambria Math" panose="02040503050406030204" pitchFamily="18" charset="0"/>
+                              <a:ea typeface="Cambria Math" panose="02040503050406030204" pitchFamily="18" charset="0"/>
+                            </a:rPr>
+                            <m:t>𝑓</m:t>
+                          </m:r>
+                        </m:e>
+                      </m:d>
+                      <m:sSub>
+                        <m:sSubPr>
+                          <m:ctrlPr>
+                            <a:rPr lang="en-US" i="1">
+                              <a:latin typeface="Cambria Math" panose="02040503050406030204" pitchFamily="18" charset="0"/>
+                              <a:ea typeface="Cambria Math" panose="02040503050406030204" pitchFamily="18" charset="0"/>
+                            </a:rPr>
+                          </m:ctrlPr>
+                        </m:sSubPr>
+                        <m:e>
+                          <m:r>
+                            <a:rPr lang="en-US" i="1">
+                              <a:latin typeface="Cambria Math" panose="02040503050406030204" pitchFamily="18" charset="0"/>
+                              <a:ea typeface="Cambria Math" panose="02040503050406030204" pitchFamily="18" charset="0"/>
+                            </a:rPr>
+                            <m:t>|</m:t>
+                          </m:r>
+                        </m:e>
+                        <m:sub>
+                          <m:r>
+                            <a:rPr lang="en-US" i="1">
+                              <a:latin typeface="Cambria Math" panose="02040503050406030204" pitchFamily="18" charset="0"/>
+                              <a:ea typeface="Cambria Math" panose="02040503050406030204" pitchFamily="18" charset="0"/>
+                            </a:rPr>
+                            <m:t>𝑓</m:t>
+                          </m:r>
+                          <m:r>
+                            <a:rPr lang="en-US" i="1">
+                              <a:latin typeface="Cambria Math" panose="02040503050406030204" pitchFamily="18" charset="0"/>
+                              <a:ea typeface="Cambria Math" panose="02040503050406030204" pitchFamily="18" charset="0"/>
+                            </a:rPr>
+                            <m:t>=0</m:t>
+                          </m:r>
+                        </m:sub>
+                      </m:sSub>
+                    </m:oMath>
+                  </m:oMathPara>
+                </a14:m>
+                <a:endParaRPr lang="en-US" dirty="0"/>
+              </a:p>
+              <a:p>
+                <a:pPr marL="0" indent="0" algn="ctr">
                   <a:buNone/>
                 </a:pPr>
                 <a:endParaRPr lang="en-US" dirty="0"/>
               </a:p>
               <a:p>
-                <a:pPr marL="0" indent="0">
-                  <a:buNone/>
-                </a:pPr>
                 <a:r>
-                  <a:rPr lang="en-US" b="0" dirty="0"/>
-                  <a:t>			             </a:t>
+                  <a:rPr lang="en-US" dirty="0"/>
+                  <a:t>Ideal ambiguity is an impulse at X(0,0) and 0 elsewhere.</a:t>
                 </a:r>
-                <a14:m>
-                  <m:oMath xmlns:m="http://schemas.openxmlformats.org/officeDocument/2006/math">
-                    <m:sSub>
-                      <m:sSubPr>
-                        <m:ctrlPr>
-                          <a:rPr lang="en-US" i="1">
-                            <a:latin typeface="Cambria Math" panose="02040503050406030204" pitchFamily="18" charset="0"/>
-                          </a:rPr>
-                        </m:ctrlPr>
-                      </m:sSubPr>
-                      <m:e>
-                        <m:r>
-                          <a:rPr lang="en-US" i="1">
-                            <a:latin typeface="Cambria Math" panose="02040503050406030204" pitchFamily="18" charset="0"/>
-                          </a:rPr>
-                          <m:t>𝑅</m:t>
-                        </m:r>
-                      </m:e>
-                      <m:sub>
-                        <m:r>
-                          <a:rPr lang="en-US" i="1">
-                            <a:latin typeface="Cambria Math" panose="02040503050406030204" pitchFamily="18" charset="0"/>
-                          </a:rPr>
-                          <m:t>𝑋𝑋</m:t>
-                        </m:r>
-                      </m:sub>
-                    </m:sSub>
-                    <m:d>
-                      <m:dPr>
-                        <m:ctrlPr>
-                          <a:rPr lang="en-US" i="1">
-                            <a:latin typeface="Cambria Math" panose="02040503050406030204" pitchFamily="18" charset="0"/>
-                          </a:rPr>
-                        </m:ctrlPr>
-                      </m:dPr>
-                      <m:e>
-                        <m:r>
-                          <a:rPr lang="en-US" i="1">
-                            <a:latin typeface="Cambria Math" panose="02040503050406030204" pitchFamily="18" charset="0"/>
-                            <a:ea typeface="Cambria Math" panose="02040503050406030204" pitchFamily="18" charset="0"/>
-                          </a:rPr>
-                          <m:t>𝜏</m:t>
-                        </m:r>
-                      </m:e>
-                    </m:d>
-                    <m:r>
-                      <a:rPr lang="en-US" b="0" i="1" smtClean="0">
-                        <a:latin typeface="Cambria Math" panose="02040503050406030204" pitchFamily="18" charset="0"/>
-                        <a:ea typeface="Cambria Math" panose="02040503050406030204" pitchFamily="18" charset="0"/>
-                      </a:rPr>
-                      <m:t>=</m:t>
-                    </m:r>
-                    <m:r>
-                      <a:rPr lang="en-US" i="1">
-                        <a:latin typeface="Cambria Math" panose="02040503050406030204" pitchFamily="18" charset="0"/>
-                      </a:rPr>
-                      <m:t>𝑋</m:t>
-                    </m:r>
-                    <m:d>
-                      <m:dPr>
-                        <m:ctrlPr>
-                          <a:rPr lang="en-US" i="1">
-                            <a:latin typeface="Cambria Math" panose="02040503050406030204" pitchFamily="18" charset="0"/>
-                          </a:rPr>
-                        </m:ctrlPr>
-                      </m:dPr>
-                      <m:e>
-                        <m:r>
-                          <a:rPr lang="en-US" i="1">
-                            <a:latin typeface="Cambria Math" panose="02040503050406030204" pitchFamily="18" charset="0"/>
-                            <a:ea typeface="Cambria Math" panose="02040503050406030204" pitchFamily="18" charset="0"/>
-                          </a:rPr>
-                          <m:t>𝜏</m:t>
-                        </m:r>
-                        <m:r>
-                          <a:rPr lang="en-US" i="1">
-                            <a:latin typeface="Cambria Math" panose="02040503050406030204" pitchFamily="18" charset="0"/>
-                            <a:ea typeface="Cambria Math" panose="02040503050406030204" pitchFamily="18" charset="0"/>
-                          </a:rPr>
-                          <m:t>,</m:t>
-                        </m:r>
-                        <m:r>
-                          <a:rPr lang="en-US" i="1">
-                            <a:latin typeface="Cambria Math" panose="02040503050406030204" pitchFamily="18" charset="0"/>
-                            <a:ea typeface="Cambria Math" panose="02040503050406030204" pitchFamily="18" charset="0"/>
-                          </a:rPr>
-                          <m:t>𝑓</m:t>
-                        </m:r>
-                      </m:e>
-                    </m:d>
-                    <m:sSub>
-                      <m:sSubPr>
-                        <m:ctrlPr>
-                          <a:rPr lang="en-US" i="1">
-                            <a:latin typeface="Cambria Math" panose="02040503050406030204" pitchFamily="18" charset="0"/>
-                            <a:ea typeface="Cambria Math" panose="02040503050406030204" pitchFamily="18" charset="0"/>
-                          </a:rPr>
-                        </m:ctrlPr>
-                      </m:sSubPr>
-                      <m:e>
-                        <m:r>
-                          <a:rPr lang="en-US" i="1">
-                            <a:latin typeface="Cambria Math" panose="02040503050406030204" pitchFamily="18" charset="0"/>
-                            <a:ea typeface="Cambria Math" panose="02040503050406030204" pitchFamily="18" charset="0"/>
-                          </a:rPr>
-                          <m:t>|</m:t>
-                        </m:r>
-                      </m:e>
-                      <m:sub>
-                        <m:r>
-                          <a:rPr lang="en-US" i="1">
-                            <a:latin typeface="Cambria Math" panose="02040503050406030204" pitchFamily="18" charset="0"/>
-                            <a:ea typeface="Cambria Math" panose="02040503050406030204" pitchFamily="18" charset="0"/>
-                          </a:rPr>
-                          <m:t>𝑓</m:t>
-                        </m:r>
-                        <m:r>
-                          <a:rPr lang="en-US" i="1">
-                            <a:latin typeface="Cambria Math" panose="02040503050406030204" pitchFamily="18" charset="0"/>
-                            <a:ea typeface="Cambria Math" panose="02040503050406030204" pitchFamily="18" charset="0"/>
-                          </a:rPr>
-                          <m:t>=0</m:t>
-                        </m:r>
-                      </m:sub>
-                    </m:sSub>
-                  </m:oMath>
-                </a14:m>
-                <a:endParaRPr lang="en-US" dirty="0"/>
               </a:p>
             </p:txBody>
           </p:sp>
         </mc:Choice>
-        <mc:Fallback>
+        <mc:Fallback xmlns="">
           <p:sp>
             <p:nvSpPr>
               <p:cNvPr id="3" name="Content Placeholder 2">
@@ -9529,7 +10115,7 @@
               <a:blipFill>
                 <a:blip r:embed="rId2"/>
                 <a:stretch>
-                  <a:fillRect l="-121" t="-316" r="-424"/>
+                  <a:fillRect l="-182" t="-158"/>
                 </a:stretch>
               </a:blipFill>
             </p:spPr>
@@ -10014,6 +10600,12 @@
                       </a:rPr>
                       <m:t>=</m:t>
                     </m:r>
+                    <m:r>
+                      <a:rPr lang="en-US" b="0" i="0" smtClean="0">
+                        <a:latin typeface="Cambria Math" panose="02040503050406030204" pitchFamily="18" charset="0"/>
+                      </a:rPr>
+                      <m:t>(</m:t>
+                    </m:r>
                     <m:sSub>
                       <m:sSubPr>
                         <m:ctrlPr>
@@ -10040,11 +10632,11 @@
                       </m:sub>
                     </m:sSub>
                     <m:r>
-                      <a:rPr lang="en-US" i="1" smtClean="0">
-                        <a:latin typeface="Cambria Math" panose="02040503050406030204" pitchFamily="18" charset="0"/>
-                        <a:ea typeface="Cambria Math" panose="02040503050406030204" pitchFamily="18" charset="0"/>
-                      </a:rPr>
-                      <m:t>∙</m:t>
+                      <m:rPr>
+                        <m:nor/>
+                      </m:rPr>
+                      <a:rPr lang="en-US"/>
+                      <m:t>⊙</m:t>
                     </m:r>
                     <m:sSubSup>
                       <m:sSubSupPr>
@@ -10083,6 +10675,13 @@
                         </m:r>
                       </m:sup>
                     </m:sSubSup>
+                    <m:r>
+                      <a:rPr lang="en-US" b="0" i="1" smtClean="0">
+                        <a:latin typeface="Cambria Math" panose="02040503050406030204" pitchFamily="18" charset="0"/>
+                        <a:ea typeface="Cambria Math" panose="02040503050406030204" pitchFamily="18" charset="0"/>
+                      </a:rPr>
+                      <m:t>)</m:t>
+                    </m:r>
                     <m:r>
                       <a:rPr lang="en-US" i="1" smtClean="0">
                         <a:latin typeface="Cambria Math" panose="02040503050406030204" pitchFamily="18" charset="0"/>
@@ -10256,7 +10855,7 @@
             </p:nvSpPr>
             <p:spPr>
               <a:xfrm>
-                <a:off x="-594001" y="5859250"/>
+                <a:off x="773480" y="5436417"/>
                 <a:ext cx="10058400" cy="3849624"/>
               </a:xfrm>
               <a:prstGeom prst="rect">
@@ -10494,6 +11093,15 @@
                 </a:pPr>
                 <a:r>
                   <a:rPr lang="en-US" i="1" dirty="0"/>
+                  <a:t>The above is done N more times, therefore…</a:t>
+                </a:r>
+              </a:p>
+              <a:p>
+                <a:pPr marL="0" indent="0" algn="ctr">
+                  <a:buNone/>
+                </a:pPr>
+                <a:r>
+                  <a:rPr lang="en-US" i="1" dirty="0"/>
                   <a:t>Complexity: </a:t>
                 </a:r>
                 <a14:m>
@@ -10503,6 +11111,18 @@
                         <a:latin typeface="Cambria Math" panose="02040503050406030204" pitchFamily="18" charset="0"/>
                       </a:rPr>
                       <m:t>𝑂</m:t>
+                    </m:r>
+                    <m:r>
+                      <a:rPr lang="en-US" b="0" i="1" smtClean="0">
+                        <a:latin typeface="Cambria Math" panose="02040503050406030204" pitchFamily="18" charset="0"/>
+                      </a:rPr>
+                      <m:t>(</m:t>
+                    </m:r>
+                    <m:r>
+                      <a:rPr lang="en-US" b="0" i="1" smtClean="0">
+                        <a:latin typeface="Cambria Math" panose="02040503050406030204" pitchFamily="18" charset="0"/>
+                      </a:rPr>
+                      <m:t>𝑛</m:t>
                     </m:r>
                     <m:r>
                       <a:rPr lang="en-US" b="0" i="1" smtClean="0">
@@ -10559,30 +11179,49 @@
                       </a:rPr>
                       <m:t>∙</m:t>
                     </m:r>
-                    <m:r>
-                      <m:rPr>
-                        <m:sty m:val="p"/>
-                      </m:rPr>
-                      <a:rPr lang="en-US" b="0" i="0" smtClean="0">
-                        <a:latin typeface="Cambria Math" panose="02040503050406030204" pitchFamily="18" charset="0"/>
-                        <a:ea typeface="Cambria Math" panose="02040503050406030204" pitchFamily="18" charset="0"/>
-                      </a:rPr>
-                      <m:t>log</m:t>
-                    </m:r>
-                    <m:r>
-                      <a:rPr lang="en-US" b="0" i="1" smtClean="0">
-                        <a:latin typeface="Cambria Math" panose="02040503050406030204" pitchFamily="18" charset="0"/>
-                        <a:ea typeface="Cambria Math" panose="02040503050406030204" pitchFamily="18" charset="0"/>
-                      </a:rPr>
-                      <m:t>⁡(</m:t>
-                    </m:r>
-                    <m:r>
-                      <a:rPr lang="en-US" b="0" i="1" smtClean="0">
-                        <a:latin typeface="Cambria Math" panose="02040503050406030204" pitchFamily="18" charset="0"/>
-                        <a:ea typeface="Cambria Math" panose="02040503050406030204" pitchFamily="18" charset="0"/>
-                      </a:rPr>
-                      <m:t>𝑛</m:t>
-                    </m:r>
+                    <m:func>
+                      <m:funcPr>
+                        <m:ctrlPr>
+                          <a:rPr lang="en-US" b="0" i="1" smtClean="0">
+                            <a:latin typeface="Cambria Math" panose="02040503050406030204" pitchFamily="18" charset="0"/>
+                            <a:ea typeface="Cambria Math" panose="02040503050406030204" pitchFamily="18" charset="0"/>
+                          </a:rPr>
+                        </m:ctrlPr>
+                      </m:funcPr>
+                      <m:fName>
+                        <m:r>
+                          <m:rPr>
+                            <m:sty m:val="p"/>
+                          </m:rPr>
+                          <a:rPr lang="en-US" b="0" i="0" smtClean="0">
+                            <a:latin typeface="Cambria Math" panose="02040503050406030204" pitchFamily="18" charset="0"/>
+                            <a:ea typeface="Cambria Math" panose="02040503050406030204" pitchFamily="18" charset="0"/>
+                          </a:rPr>
+                          <m:t>log</m:t>
+                        </m:r>
+                      </m:fName>
+                      <m:e>
+                        <m:d>
+                          <m:dPr>
+                            <m:ctrlPr>
+                              <a:rPr lang="en-US" b="0" i="1" smtClean="0">
+                                <a:latin typeface="Cambria Math" panose="02040503050406030204" pitchFamily="18" charset="0"/>
+                                <a:ea typeface="Cambria Math" panose="02040503050406030204" pitchFamily="18" charset="0"/>
+                              </a:rPr>
+                            </m:ctrlPr>
+                          </m:dPr>
+                          <m:e>
+                            <m:r>
+                              <a:rPr lang="en-US" b="0" i="1" smtClean="0">
+                                <a:latin typeface="Cambria Math" panose="02040503050406030204" pitchFamily="18" charset="0"/>
+                                <a:ea typeface="Cambria Math" panose="02040503050406030204" pitchFamily="18" charset="0"/>
+                              </a:rPr>
+                              <m:t>𝑛</m:t>
+                            </m:r>
+                          </m:e>
+                        </m:d>
+                      </m:e>
+                    </m:func>
                     <m:r>
                       <a:rPr lang="en-US" b="0" i="1" smtClean="0">
                         <a:latin typeface="Cambria Math" panose="02040503050406030204" pitchFamily="18" charset="0"/>
@@ -10591,72 +11230,119 @@
                       <m:t>))→</m:t>
                     </m:r>
                     <m:r>
-                      <a:rPr lang="en-US" b="0" i="1" smtClean="0">
+                      <a:rPr lang="en-US" b="1" i="1" smtClean="0">
                         <a:latin typeface="Cambria Math" panose="02040503050406030204" pitchFamily="18" charset="0"/>
                         <a:ea typeface="Cambria Math" panose="02040503050406030204" pitchFamily="18" charset="0"/>
                       </a:rPr>
-                      <m:t>𝑂</m:t>
+                      <m:t>𝑶</m:t>
                     </m:r>
                     <m:r>
-                      <a:rPr lang="en-US" b="0" i="1" smtClean="0">
+                      <a:rPr lang="en-US" b="1" i="1" smtClean="0">
                         <a:latin typeface="Cambria Math" panose="02040503050406030204" pitchFamily="18" charset="0"/>
                         <a:ea typeface="Cambria Math" panose="02040503050406030204" pitchFamily="18" charset="0"/>
                       </a:rPr>
-                      <m:t>(3</m:t>
+                      <m:t>(</m:t>
                     </m:r>
                     <m:r>
-                      <a:rPr lang="en-US" b="0" i="1" smtClean="0">
+                      <a:rPr lang="en-US" b="1" i="1" smtClean="0">
                         <a:latin typeface="Cambria Math" panose="02040503050406030204" pitchFamily="18" charset="0"/>
                         <a:ea typeface="Cambria Math" panose="02040503050406030204" pitchFamily="18" charset="0"/>
                       </a:rPr>
-                      <m:t>𝑛</m:t>
+                      <m:t>𝟑</m:t>
                     </m:r>
+                    <m:sSup>
+                      <m:sSupPr>
+                        <m:ctrlPr>
+                          <a:rPr lang="en-US" b="1" i="1" smtClean="0">
+                            <a:latin typeface="Cambria Math" panose="02040503050406030204" pitchFamily="18" charset="0"/>
+                            <a:ea typeface="Cambria Math" panose="02040503050406030204" pitchFamily="18" charset="0"/>
+                          </a:rPr>
+                        </m:ctrlPr>
+                      </m:sSupPr>
+                      <m:e>
+                        <m:r>
+                          <a:rPr lang="en-US" b="1" i="1" smtClean="0">
+                            <a:latin typeface="Cambria Math" panose="02040503050406030204" pitchFamily="18" charset="0"/>
+                            <a:ea typeface="Cambria Math" panose="02040503050406030204" pitchFamily="18" charset="0"/>
+                          </a:rPr>
+                          <m:t>𝒏</m:t>
+                        </m:r>
+                      </m:e>
+                      <m:sup>
+                        <m:r>
+                          <a:rPr lang="en-US" b="1" i="1" smtClean="0">
+                            <a:latin typeface="Cambria Math" panose="02040503050406030204" pitchFamily="18" charset="0"/>
+                            <a:ea typeface="Cambria Math" panose="02040503050406030204" pitchFamily="18" charset="0"/>
+                          </a:rPr>
+                          <m:t>𝟐</m:t>
+                        </m:r>
+                      </m:sup>
+                    </m:sSup>
                     <m:r>
-                      <a:rPr lang="en-US" b="0" i="1" smtClean="0">
+                      <a:rPr lang="en-US" b="1" i="1" smtClean="0">
                         <a:latin typeface="Cambria Math" panose="02040503050406030204" pitchFamily="18" charset="0"/>
                         <a:ea typeface="Cambria Math" panose="02040503050406030204" pitchFamily="18" charset="0"/>
                       </a:rPr>
                       <m:t>+</m:t>
                     </m:r>
+                    <m:sSup>
+                      <m:sSupPr>
+                        <m:ctrlPr>
+                          <a:rPr lang="en-US" b="1" i="1" smtClean="0">
+                            <a:latin typeface="Cambria Math" panose="02040503050406030204" pitchFamily="18" charset="0"/>
+                            <a:ea typeface="Cambria Math" panose="02040503050406030204" pitchFamily="18" charset="0"/>
+                          </a:rPr>
+                        </m:ctrlPr>
+                      </m:sSupPr>
+                      <m:e>
+                        <m:r>
+                          <a:rPr lang="en-US" b="1" i="1" smtClean="0">
+                            <a:latin typeface="Cambria Math" panose="02040503050406030204" pitchFamily="18" charset="0"/>
+                            <a:ea typeface="Cambria Math" panose="02040503050406030204" pitchFamily="18" charset="0"/>
+                          </a:rPr>
+                          <m:t>𝒏</m:t>
+                        </m:r>
+                      </m:e>
+                      <m:sup>
+                        <m:r>
+                          <a:rPr lang="en-US" b="1" i="1" smtClean="0">
+                            <a:latin typeface="Cambria Math" panose="02040503050406030204" pitchFamily="18" charset="0"/>
+                            <a:ea typeface="Cambria Math" panose="02040503050406030204" pitchFamily="18" charset="0"/>
+                          </a:rPr>
+                          <m:t>𝟐</m:t>
+                        </m:r>
+                      </m:sup>
+                    </m:sSup>
                     <m:r>
-                      <a:rPr lang="en-US" i="1">
-                        <a:latin typeface="Cambria Math" panose="02040503050406030204" pitchFamily="18" charset="0"/>
-                      </a:rPr>
-                      <m:t>𝑛</m:t>
-                    </m:r>
-                    <m:r>
-                      <a:rPr lang="en-US" i="1">
+                      <a:rPr lang="en-US" b="1" i="1">
                         <a:latin typeface="Cambria Math" panose="02040503050406030204" pitchFamily="18" charset="0"/>
                         <a:ea typeface="Cambria Math" panose="02040503050406030204" pitchFamily="18" charset="0"/>
                       </a:rPr>
                       <m:t>∙</m:t>
                     </m:r>
                     <m:r>
-                      <m:rPr>
-                        <m:sty m:val="p"/>
-                      </m:rPr>
-                      <a:rPr lang="en-US">
+                      <a:rPr lang="en-US" b="1" i="1">
                         <a:latin typeface="Cambria Math" panose="02040503050406030204" pitchFamily="18" charset="0"/>
                         <a:ea typeface="Cambria Math" panose="02040503050406030204" pitchFamily="18" charset="0"/>
                       </a:rPr>
-                      <m:t>log</m:t>
+                      <m:t>𝒍𝒐𝒈</m:t>
                     </m:r>
                     <m:r>
-                      <a:rPr lang="en-US" i="1">
+                      <a:rPr lang="en-US" b="1" i="1">
                         <a:latin typeface="Cambria Math" panose="02040503050406030204" pitchFamily="18" charset="0"/>
                         <a:ea typeface="Cambria Math" panose="02040503050406030204" pitchFamily="18" charset="0"/>
                       </a:rPr>
                       <m:t>⁡(</m:t>
                     </m:r>
                     <m:r>
-                      <a:rPr lang="en-US" i="1">
+                      <a:rPr lang="en-US" b="1" i="1">
                         <a:latin typeface="Cambria Math" panose="02040503050406030204" pitchFamily="18" charset="0"/>
                         <a:ea typeface="Cambria Math" panose="02040503050406030204" pitchFamily="18" charset="0"/>
                       </a:rPr>
-                      <m:t>𝑛</m:t>
+                      <m:t>𝒏</m:t>
                     </m:r>
                     <m:r>
-                      <a:rPr lang="en-US" i="1">
+                      <a:rPr lang="en-US" b="1" i="1">
                         <a:latin typeface="Cambria Math" panose="02040503050406030204" pitchFamily="18" charset="0"/>
                         <a:ea typeface="Cambria Math" panose="02040503050406030204" pitchFamily="18" charset="0"/>
                       </a:rPr>
@@ -10664,7 +11350,7 @@
                     </m:r>
                   </m:oMath>
                 </a14:m>
-                <a:endParaRPr lang="en-US" i="1" dirty="0"/>
+                <a:endParaRPr lang="en-US" b="1" i="1" dirty="0"/>
               </a:p>
             </p:txBody>
           </p:sp>
@@ -10686,7 +11372,7 @@
             </p:nvSpPr>
             <p:spPr>
               <a:xfrm>
-                <a:off x="-594001" y="5859250"/>
+                <a:off x="773480" y="5436417"/>
                 <a:ext cx="10058400" cy="3849624"/>
               </a:xfrm>
               <a:prstGeom prst="rect">
@@ -10714,12 +11400,48 @@
           </p:sp>
         </mc:Fallback>
       </mc:AlternateContent>
+      <p:sp>
+        <p:nvSpPr>
+          <p:cNvPr id="9" name="TextBox 8">
+            <a:extLst>
+              <a:ext uri="{FF2B5EF4-FFF2-40B4-BE49-F238E27FC236}">
+                <a16:creationId xmlns:a16="http://schemas.microsoft.com/office/drawing/2014/main" id="{7C809994-F456-468A-8FFC-CCA68C7E33AA}"/>
+              </a:ext>
+            </a:extLst>
+          </p:cNvPr>
+          <p:cNvSpPr txBox="1"/>
+          <p:nvPr/>
+        </p:nvSpPr>
+        <p:spPr>
+          <a:xfrm>
+            <a:off x="1605500" y="1841785"/>
+            <a:ext cx="8015417" cy="261610"/>
+          </a:xfrm>
+          <a:prstGeom prst="rect">
+            <a:avLst/>
+          </a:prstGeom>
+          <a:noFill/>
+        </p:spPr>
+        <p:txBody>
+          <a:bodyPr wrap="square" rtlCol="0">
+            <a:spAutoFit/>
+          </a:bodyPr>
+          <a:lstStyle/>
+          <a:p>
+            <a:r>
+              <a:rPr lang="en-US" sz="1100" i="1" dirty="0"/>
+              <a:t>Steps: [1] complex conjugate. [2] circular shift by K. [3] element-wise multiply. [4] N-point IFFT. [5] Repeat for each K.</a:t>
+            </a:r>
+            <a:endParaRPr lang="en-US" sz="1100" dirty="0"/>
+          </a:p>
+        </p:txBody>
+      </p:sp>
       <p:pic>
         <p:nvPicPr>
-          <p:cNvPr id="7" name="Content Placeholder 6">
+          <p:cNvPr id="13" name="Content Placeholder 12">
             <a:extLst>
               <a:ext uri="{FF2B5EF4-FFF2-40B4-BE49-F238E27FC236}">
-                <a16:creationId xmlns:a16="http://schemas.microsoft.com/office/drawing/2014/main" id="{F054A270-4E8C-41F9-B673-87FCF144BDB9}"/>
+                <a16:creationId xmlns:a16="http://schemas.microsoft.com/office/drawing/2014/main" id="{600B85A2-B7BE-4BD9-9A6E-83CC48C31D17}"/>
               </a:ext>
             </a:extLst>
           </p:cNvPr>
@@ -10744,8 +11466,8 @@
         </p:blipFill>
         <p:spPr>
           <a:xfrm>
-            <a:off x="532446" y="2160109"/>
-            <a:ext cx="11127108" cy="3427720"/>
+            <a:off x="1066800" y="2078714"/>
+            <a:ext cx="10058400" cy="3203981"/>
           </a:xfrm>
         </p:spPr>
       </p:pic>
@@ -11269,15 +11991,6 @@
 </file>
 
 <file path=customXml/item1.xml><?xml version="1.0" encoding="utf-8"?>
-<p:properties xmlns:p="http://schemas.microsoft.com/office/2006/metadata/properties" xmlns:xsi="http://www.w3.org/2001/XMLSchema-instance" xmlns:pc="http://schemas.microsoft.com/office/infopath/2007/PartnerControls">
-  <documentManagement>
-    <Status xmlns="71af3243-3dd4-4a8d-8c0d-dd76da1f02a5">Not started</Status>
-    <MediaServiceKeyPoints xmlns="71af3243-3dd4-4a8d-8c0d-dd76da1f02a5" xsi:nil="true"/>
-  </documentManagement>
-</p:properties>
-</file>
-
-<file path=customXml/item2.xml><?xml version="1.0" encoding="utf-8"?>
 <ct:contentTypeSchema xmlns:ct="http://schemas.microsoft.com/office/2006/metadata/contentType" xmlns:ma="http://schemas.microsoft.com/office/2006/metadata/properties/metaAttributes" ct:_="" ma:_="" ma:contentTypeName="Document" ma:contentTypeID="0x01010079F111ED35F8CC479449609E8A0923A6" ma:contentTypeVersion="12" ma:contentTypeDescription="Create a new document." ma:contentTypeScope="" ma:versionID="a410dd7f93c95333ffa1b60ed6adedd1">
   <xsd:schema xmlns:xsd="http://www.w3.org/2001/XMLSchema" xmlns:xs="http://www.w3.org/2001/XMLSchema" xmlns:p="http://schemas.microsoft.com/office/2006/metadata/properties" xmlns:ns2="71af3243-3dd4-4a8d-8c0d-dd76da1f02a5" xmlns:ns3="16c05727-aa75-4e4a-9b5f-8a80a1165891" targetNamespace="http://schemas.microsoft.com/office/2006/metadata/properties" ma:root="true" ma:fieldsID="a936d9baba76aa3866493feff160faab" ns2:_="" ns3:_="">
     <xsd:import namespace="71af3243-3dd4-4a8d-8c0d-dd76da1f02a5"/>
@@ -11498,6 +12211,15 @@
 </ct:contentTypeSchema>
 </file>
 
+<file path=customXml/item2.xml><?xml version="1.0" encoding="utf-8"?>
+<p:properties xmlns:p="http://schemas.microsoft.com/office/2006/metadata/properties" xmlns:xsi="http://www.w3.org/2001/XMLSchema-instance" xmlns:pc="http://schemas.microsoft.com/office/infopath/2007/PartnerControls">
+  <documentManagement>
+    <Status xmlns="71af3243-3dd4-4a8d-8c0d-dd76da1f02a5">Not started</Status>
+    <MediaServiceKeyPoints xmlns="71af3243-3dd4-4a8d-8c0d-dd76da1f02a5" xsi:nil="true"/>
+  </documentManagement>
+</p:properties>
+</file>
+
 <file path=customXml/item3.xml><?xml version="1.0" encoding="utf-8"?>
 <?mso-contentType ?>
 <FormTemplates xmlns="http://schemas.microsoft.com/sharepoint/v3/contenttype/forms">
@@ -11508,16 +12230,6 @@
 </file>
 
 <file path=customXml/itemProps1.xml><?xml version="1.0" encoding="utf-8"?>
-<ds:datastoreItem xmlns:ds="http://schemas.openxmlformats.org/officeDocument/2006/customXml" ds:itemID="{137651BA-F45C-4845-9AB3-E0A65B39F5E1}">
-  <ds:schemaRefs>
-    <ds:schemaRef ds:uri="http://schemas.microsoft.com/office/2006/metadata/properties"/>
-    <ds:schemaRef ds:uri="http://schemas.microsoft.com/office/infopath/2007/PartnerControls"/>
-    <ds:schemaRef ds:uri="71af3243-3dd4-4a8d-8c0d-dd76da1f02a5"/>
-  </ds:schemaRefs>
-</ds:datastoreItem>
-</file>
-
-<file path=customXml/itemProps2.xml><?xml version="1.0" encoding="utf-8"?>
 <ds:datastoreItem xmlns:ds="http://schemas.openxmlformats.org/officeDocument/2006/customXml" ds:itemID="{2D276E62-80A3-44DD-9BCC-97ED2B99B57F}">
   <ds:schemaRefs>
     <ds:schemaRef ds:uri="http://schemas.microsoft.com/office/2006/metadata/contentType"/>
@@ -11536,6 +12248,16 @@
 </ds:datastoreItem>
 </file>
 
+<file path=customXml/itemProps2.xml><?xml version="1.0" encoding="utf-8"?>
+<ds:datastoreItem xmlns:ds="http://schemas.openxmlformats.org/officeDocument/2006/customXml" ds:itemID="{137651BA-F45C-4845-9AB3-E0A65B39F5E1}">
+  <ds:schemaRefs>
+    <ds:schemaRef ds:uri="http://schemas.microsoft.com/office/2006/metadata/properties"/>
+    <ds:schemaRef ds:uri="http://schemas.microsoft.com/office/infopath/2007/PartnerControls"/>
+    <ds:schemaRef ds:uri="71af3243-3dd4-4a8d-8c0d-dd76da1f02a5"/>
+  </ds:schemaRefs>
+</ds:datastoreItem>
+</file>
+
 <file path=customXml/itemProps3.xml><?xml version="1.0" encoding="utf-8"?>
 <ds:datastoreItem xmlns:ds="http://schemas.openxmlformats.org/officeDocument/2006/customXml" ds:itemID="{CDB58277-F8DF-46FF-84EC-EF41B835E69F}">
   <ds:schemaRefs>

</xml_diff>